<commit_message>
update fonts to helvetica
</commit_message>
<xml_diff>
--- a/assets/intro/IDEA_intro_chapter_graph.pptx
+++ b/assets/intro/IDEA_intro_chapter_graph.pptx
@@ -229,7 +229,7 @@
           <a:p>
             <a:fld id="{92E55F76-9064-0840-B7BD-54E57059BB4C}" type="datetimeFigureOut">
               <a:rPr lang="en-US" smtClean="0"/>
-              <a:t>2020-11-05</a:t>
+              <a:t>2020-11-25</a:t>
             </a:fld>
             <a:endParaRPr lang="en-US"/>
           </a:p>
@@ -10769,7 +10769,9 @@
           <a:lstStyle/>
           <a:p>
             <a:r>
-              <a:rPr lang="en-US" dirty="0"/>
+              <a:rPr lang="en-US" dirty="0">
+                <a:latin typeface="Helvetica" pitchFamily="2" charset="0"/>
+              </a:rPr>
               <a:t>Version 2: condensed</a:t>
             </a:r>
           </a:p>
@@ -10898,6 +10900,7 @@
                 <a:solidFill>
                   <a:schemeClr val="accent2"/>
                 </a:solidFill>
+                <a:latin typeface="Helvetica" pitchFamily="2" charset="0"/>
               </a:rPr>
               <a:t>DIME</a:t>
             </a:r>
@@ -10956,7 +10959,9 @@
           <a:lstStyle/>
           <a:p>
             <a:pPr algn="ctr"/>
-            <a:endParaRPr lang="en-US"/>
+            <a:endParaRPr lang="en-US">
+              <a:latin typeface="Helvetica" pitchFamily="2" charset="0"/>
+            </a:endParaRPr>
           </a:p>
         </p:txBody>
       </p:sp>
@@ -11012,7 +11017,9 @@
           <a:lstStyle/>
           <a:p>
             <a:pPr algn="ctr"/>
-            <a:endParaRPr lang="en-US"/>
+            <a:endParaRPr lang="en-US">
+              <a:latin typeface="Helvetica" pitchFamily="2" charset="0"/>
+            </a:endParaRPr>
           </a:p>
         </p:txBody>
       </p:sp>
@@ -11049,6 +11056,7 @@
                 <a:solidFill>
                   <a:schemeClr val="tx2"/>
                 </a:solidFill>
+                <a:latin typeface="Helvetica" pitchFamily="2" charset="0"/>
               </a:rPr>
               <a:t>IMF</a:t>
             </a:r>
@@ -11107,7 +11115,9 @@
           <a:lstStyle/>
           <a:p>
             <a:pPr algn="ctr"/>
-            <a:endParaRPr lang="en-US"/>
+            <a:endParaRPr lang="en-US">
+              <a:latin typeface="Helvetica" pitchFamily="2" charset="0"/>
+            </a:endParaRPr>
           </a:p>
         </p:txBody>
       </p:sp>
@@ -11144,6 +11154,7 @@
                 <a:solidFill>
                   <a:schemeClr val="accent5"/>
                 </a:solidFill>
+                <a:latin typeface="Helvetica" pitchFamily="2" charset="0"/>
               </a:rPr>
               <a:t>IAB</a:t>
             </a:r>
@@ -11183,6 +11194,7 @@
                 <a:solidFill>
                   <a:schemeClr val="accent4"/>
                 </a:solidFill>
+                <a:latin typeface="Helvetica" pitchFamily="2" charset="0"/>
               </a:rPr>
               <a:t>Stanford-SFUSD</a:t>
             </a:r>
@@ -11193,6 +11205,7 @@
                 <a:solidFill>
                   <a:schemeClr val="accent4"/>
                 </a:solidFill>
+                <a:latin typeface="Helvetica" pitchFamily="2" charset="0"/>
               </a:rPr>
               <a:t>Partnership</a:t>
             </a:r>
@@ -11251,7 +11264,9 @@
           <a:lstStyle/>
           <a:p>
             <a:pPr algn="ctr"/>
-            <a:endParaRPr lang="en-US"/>
+            <a:endParaRPr lang="en-US">
+              <a:latin typeface="Helvetica" pitchFamily="2" charset="0"/>
+            </a:endParaRPr>
           </a:p>
         </p:txBody>
       </p:sp>
@@ -11288,6 +11303,7 @@
                 <a:solidFill>
                   <a:schemeClr val="tx2"/>
                 </a:solidFill>
+                <a:latin typeface="Helvetica" pitchFamily="2" charset="0"/>
               </a:rPr>
               <a:t>CCT</a:t>
             </a:r>
@@ -11346,7 +11362,9 @@
           <a:lstStyle/>
           <a:p>
             <a:pPr algn="ctr"/>
-            <a:endParaRPr lang="en-US"/>
+            <a:endParaRPr lang="en-US">
+              <a:latin typeface="Helvetica" pitchFamily="2" charset="0"/>
+            </a:endParaRPr>
           </a:p>
         </p:txBody>
       </p:sp>
@@ -11383,6 +11401,7 @@
                 <a:solidFill>
                   <a:schemeClr val="accent1"/>
                 </a:solidFill>
+                <a:latin typeface="Helvetica" pitchFamily="2" charset="0"/>
               </a:rPr>
               <a:t>OLDA</a:t>
             </a:r>
@@ -11441,7 +11460,9 @@
           <a:lstStyle/>
           <a:p>
             <a:pPr algn="ctr"/>
-            <a:endParaRPr lang="en-US"/>
+            <a:endParaRPr lang="en-US">
+              <a:latin typeface="Helvetica" pitchFamily="2" charset="0"/>
+            </a:endParaRPr>
           </a:p>
         </p:txBody>
       </p:sp>
@@ -11497,7 +11518,9 @@
           <a:lstStyle/>
           <a:p>
             <a:pPr algn="ctr"/>
-            <a:endParaRPr lang="en-US"/>
+            <a:endParaRPr lang="en-US">
+              <a:latin typeface="Helvetica" pitchFamily="2" charset="0"/>
+            </a:endParaRPr>
           </a:p>
         </p:txBody>
       </p:sp>
@@ -11534,6 +11557,7 @@
                 <a:solidFill>
                   <a:schemeClr val="tx2"/>
                 </a:solidFill>
+                <a:latin typeface="Helvetica" pitchFamily="2" charset="0"/>
               </a:rPr>
               <a:t>PCRI</a:t>
             </a:r>
@@ -11592,7 +11616,9 @@
           <a:lstStyle/>
           <a:p>
             <a:pPr algn="ctr"/>
-            <a:endParaRPr lang="en-US"/>
+            <a:endParaRPr lang="en-US">
+              <a:latin typeface="Helvetica" pitchFamily="2" charset="0"/>
+            </a:endParaRPr>
           </a:p>
         </p:txBody>
       </p:sp>
@@ -11629,6 +11655,7 @@
                 <a:solidFill>
                   <a:schemeClr val="tx2"/>
                 </a:solidFill>
+                <a:latin typeface="Helvetica" pitchFamily="2" charset="0"/>
               </a:rPr>
               <a:t>Aurora</a:t>
             </a:r>
@@ -11687,7 +11714,9 @@
           <a:lstStyle/>
           <a:p>
             <a:pPr algn="ctr"/>
-            <a:endParaRPr lang="en-US"/>
+            <a:endParaRPr lang="en-US">
+              <a:latin typeface="Helvetica" pitchFamily="2" charset="0"/>
+            </a:endParaRPr>
           </a:p>
         </p:txBody>
       </p:sp>
@@ -11724,6 +11753,7 @@
                 <a:solidFill>
                   <a:schemeClr val="tx2"/>
                 </a:solidFill>
+                <a:latin typeface="Helvetica" pitchFamily="2" charset="0"/>
               </a:rPr>
               <a:t>GoI</a:t>
             </a:r>
@@ -11763,6 +11793,7 @@
                 <a:solidFill>
                   <a:schemeClr val="tx2"/>
                 </a:solidFill>
+                <a:latin typeface="Helvetica" pitchFamily="2" charset="0"/>
               </a:rPr>
               <a:t>NB-IRDT</a:t>
             </a:r>
@@ -11825,6 +11856,7 @@
               <a:solidFill>
                 <a:schemeClr val="bg2"/>
               </a:solidFill>
+              <a:latin typeface="Helvetica" pitchFamily="2" charset="0"/>
             </a:endParaRPr>
           </a:p>
         </p:txBody>
@@ -11859,7 +11891,9 @@
           <a:p>
             <a:pPr algn="ctr"/>
             <a:r>
-              <a:rPr lang="en-US" sz="1400" dirty="0"/>
+              <a:rPr lang="en-US" sz="1400" dirty="0">
+                <a:latin typeface="Helvetica" pitchFamily="2" charset="0"/>
+              </a:rPr>
               <a:t>Diverse set of researchers from different institutions and countries</a:t>
             </a:r>
           </a:p>
@@ -11895,7 +11929,9 @@
           <a:p>
             <a:pPr algn="ctr"/>
             <a:r>
-              <a:rPr lang="en-US" sz="1400" dirty="0"/>
+              <a:rPr lang="en-US" sz="1400" dirty="0">
+                <a:latin typeface="Helvetica" pitchFamily="2" charset="0"/>
+              </a:rPr>
               <a:t>Access restricted to closed group of researchers at one institution</a:t>
             </a:r>
           </a:p>
@@ -11916,7 +11952,7 @@
         <p:spPr>
           <a:xfrm>
             <a:off x="100549" y="2893455"/>
-            <a:ext cx="1515125" cy="1815882"/>
+            <a:ext cx="1515125" cy="1600438"/>
           </a:xfrm>
           <a:prstGeom prst="rect">
             <a:avLst/>
@@ -11931,7 +11967,9 @@
           <a:p>
             <a:pPr algn="ctr"/>
             <a:r>
-              <a:rPr lang="en-US" sz="1400" dirty="0"/>
+              <a:rPr lang="en-US" sz="1400" dirty="0">
+                <a:latin typeface="Helvetica" pitchFamily="2" charset="0"/>
+              </a:rPr>
               <a:t>Close collaboration with one (public) data provider, focusing on one or few types of data</a:t>
             </a:r>
           </a:p>
@@ -11952,7 +11990,7 @@
         <p:spPr>
           <a:xfrm>
             <a:off x="5993287" y="3040053"/>
-            <a:ext cx="1402505" cy="1384995"/>
+            <a:ext cx="1402505" cy="1169551"/>
           </a:xfrm>
           <a:prstGeom prst="rect">
             <a:avLst/>
@@ -11967,7 +12005,9 @@
           <a:p>
             <a:pPr algn="ctr"/>
             <a:r>
-              <a:rPr lang="en-US" sz="1400" dirty="0"/>
+              <a:rPr lang="en-US" sz="1400" dirty="0">
+                <a:latin typeface="Helvetica" pitchFamily="2" charset="0"/>
+              </a:rPr>
               <a:t>Diverse set of data sources and public and private data providers</a:t>
             </a:r>
           </a:p>
@@ -11988,7 +12028,7 @@
         <p:grpSpPr>
           <a:xfrm>
             <a:off x="7508671" y="1064017"/>
-            <a:ext cx="2736338" cy="5012572"/>
+            <a:ext cx="2523994" cy="5012572"/>
             <a:chOff x="7294267" y="1229328"/>
             <a:chExt cx="2832315" cy="3966127"/>
           </a:xfrm>
@@ -12008,7 +12048,7 @@
           <p:spPr>
             <a:xfrm>
               <a:off x="7454686" y="1229328"/>
-              <a:ext cx="2671890" cy="1384995"/>
+              <a:ext cx="2671890" cy="925391"/>
             </a:xfrm>
             <a:prstGeom prst="rect">
               <a:avLst/>
@@ -12022,7 +12062,9 @@
             <a:lstStyle/>
             <a:p>
               <a:r>
-                <a:rPr lang="en-US" sz="1400" dirty="0"/>
+                <a:rPr lang="en-US" sz="1400" dirty="0">
+                  <a:latin typeface="Helvetica" pitchFamily="2" charset="0"/>
+                </a:rPr>
                 <a:t>The IAB partners with researchers at organizations in multiple countries and provides specialized access to German labor market data</a:t>
               </a:r>
             </a:p>
@@ -12043,7 +12085,7 @@
           <p:spPr>
             <a:xfrm>
               <a:off x="7447231" y="2337427"/>
-              <a:ext cx="2679345" cy="1169551"/>
+              <a:ext cx="2679345" cy="925391"/>
             </a:xfrm>
             <a:prstGeom prst="rect">
               <a:avLst/>
@@ -12057,7 +12099,9 @@
             <a:lstStyle/>
             <a:p>
               <a:r>
-                <a:rPr lang="en-US" sz="1400" dirty="0"/>
+                <a:rPr lang="en-US" sz="1400" dirty="0">
+                  <a:latin typeface="Helvetica" pitchFamily="2" charset="0"/>
+                </a:rPr>
                 <a:t>OLDA partners with researchers at multiple institutions and with a variety of data providers within the state of Ohio </a:t>
               </a:r>
             </a:p>
@@ -12078,7 +12122,7 @@
           <p:spPr>
             <a:xfrm>
               <a:off x="7447231" y="3402027"/>
-              <a:ext cx="2679351" cy="954107"/>
+              <a:ext cx="2679351" cy="754924"/>
             </a:xfrm>
             <a:prstGeom prst="rect">
               <a:avLst/>
@@ -12092,7 +12136,9 @@
             <a:lstStyle/>
             <a:p>
               <a:r>
-                <a:rPr lang="en-US" sz="1400" dirty="0"/>
+                <a:rPr lang="en-US" sz="1400" dirty="0">
+                  <a:latin typeface="Helvetica" pitchFamily="2" charset="0"/>
+                </a:rPr>
                 <a:t>DIME works with diverse data globally, with a highly specialized internal research team</a:t>
               </a:r>
             </a:p>
@@ -12127,7 +12173,9 @@
             <a:lstStyle/>
             <a:p>
               <a:r>
-                <a:rPr lang="en-US" sz="1400" dirty="0"/>
+                <a:rPr lang="en-US" sz="1400" dirty="0">
+                  <a:latin typeface="Helvetica" pitchFamily="2" charset="0"/>
+                </a:rPr>
                 <a:t>The Stanford-SFUSD Partnership builds a close relationship between one research institution and one data provider </a:t>
               </a:r>
             </a:p>
@@ -12185,7 +12233,9 @@
             <a:lstStyle/>
             <a:p>
               <a:pPr algn="ctr"/>
-              <a:endParaRPr lang="en-US" dirty="0"/>
+              <a:endParaRPr lang="en-US" dirty="0">
+                <a:latin typeface="Helvetica" pitchFamily="2" charset="0"/>
+              </a:endParaRPr>
             </a:p>
           </p:txBody>
         </p:sp>
@@ -12241,7 +12291,9 @@
             <a:lstStyle/>
             <a:p>
               <a:pPr algn="ctr"/>
-              <a:endParaRPr lang="en-US"/>
+              <a:endParaRPr lang="en-US">
+                <a:latin typeface="Helvetica" pitchFamily="2" charset="0"/>
+              </a:endParaRPr>
             </a:p>
           </p:txBody>
         </p:sp>
@@ -12297,7 +12349,9 @@
             <a:lstStyle/>
             <a:p>
               <a:pPr algn="ctr"/>
-              <a:endParaRPr lang="en-US" dirty="0"/>
+              <a:endParaRPr lang="en-US" dirty="0">
+                <a:latin typeface="Helvetica" pitchFamily="2" charset="0"/>
+              </a:endParaRPr>
             </a:p>
           </p:txBody>
         </p:sp>
@@ -12353,7 +12407,9 @@
             <a:lstStyle/>
             <a:p>
               <a:pPr algn="ctr"/>
-              <a:endParaRPr lang="en-US"/>
+              <a:endParaRPr lang="en-US">
+                <a:latin typeface="Helvetica" pitchFamily="2" charset="0"/>
+              </a:endParaRPr>
             </a:p>
           </p:txBody>
         </p:sp>

</xml_diff>

<commit_message>
narrower so font is bigger
</commit_message>
<xml_diff>
--- a/assets/intro/IDEA_intro_chapter_graph.pptx
+++ b/assets/intro/IDEA_intro_chapter_graph.pptx
@@ -523,7 +523,12 @@
             <p:ph type="sldImg"/>
           </p:nvPr>
         </p:nvSpPr>
-        <p:spPr/>
+        <p:spPr>
+          <a:xfrm>
+            <a:off x="685800" y="1143000"/>
+            <a:ext cx="5486400" cy="3086100"/>
+          </a:xfrm>
+        </p:spPr>
       </p:sp>
       <p:sp>
         <p:nvSpPr>
@@ -680,7 +685,12 @@
             <p:ph type="sldImg"/>
           </p:nvPr>
         </p:nvSpPr>
-        <p:spPr/>
+        <p:spPr>
+          <a:xfrm>
+            <a:off x="685800" y="1143000"/>
+            <a:ext cx="5486400" cy="3086100"/>
+          </a:xfrm>
+        </p:spPr>
       </p:sp>
       <p:sp>
         <p:nvSpPr>
@@ -837,7 +847,12 @@
             <p:ph type="sldImg"/>
           </p:nvPr>
         </p:nvSpPr>
-        <p:spPr/>
+        <p:spPr>
+          <a:xfrm>
+            <a:off x="685800" y="1143000"/>
+            <a:ext cx="5486400" cy="3086100"/>
+          </a:xfrm>
+        </p:spPr>
       </p:sp>
       <p:sp>
         <p:nvSpPr>
@@ -994,7 +1009,12 @@
             <p:ph type="sldImg"/>
           </p:nvPr>
         </p:nvSpPr>
-        <p:spPr/>
+        <p:spPr>
+          <a:xfrm>
+            <a:off x="685800" y="1143000"/>
+            <a:ext cx="5486400" cy="3086100"/>
+          </a:xfrm>
+        </p:spPr>
       </p:sp>
       <p:sp>
         <p:nvSpPr>
@@ -1154,7 +1174,7 @@
         </p:nvSpPr>
         <p:spPr>
           <a:xfrm>
-            <a:off x="0" y="13878"/>
+            <a:off x="0" y="13880"/>
             <a:ext cx="12192000" cy="6851061"/>
           </a:xfrm>
           <a:prstGeom prst="rect">
@@ -1203,7 +1223,7 @@
         </p:nvSpPr>
         <p:spPr>
           <a:xfrm>
-            <a:off x="842749" y="2553629"/>
+            <a:off x="842750" y="2553631"/>
             <a:ext cx="8638217" cy="1470025"/>
           </a:xfrm>
         </p:spPr>
@@ -1239,7 +1259,7 @@
         </p:nvSpPr>
         <p:spPr>
           <a:xfrm>
-            <a:off x="846025" y="4406548"/>
+            <a:off x="846026" y="4406548"/>
             <a:ext cx="8638217" cy="1752600"/>
           </a:xfrm>
         </p:spPr>
@@ -1259,7 +1279,7 @@
                 </a:solidFill>
               </a:defRPr>
             </a:lvl1pPr>
-            <a:lvl2pPr marL="457200" indent="0" algn="ctr">
+            <a:lvl2pPr marL="457189" indent="0" algn="ctr">
               <a:buNone/>
               <a:defRPr>
                 <a:solidFill>
@@ -1269,7 +1289,7 @@
                 </a:solidFill>
               </a:defRPr>
             </a:lvl2pPr>
-            <a:lvl3pPr marL="914400" indent="0" algn="ctr">
+            <a:lvl3pPr marL="914377" indent="0" algn="ctr">
               <a:buNone/>
               <a:defRPr>
                 <a:solidFill>
@@ -1279,7 +1299,7 @@
                 </a:solidFill>
               </a:defRPr>
             </a:lvl3pPr>
-            <a:lvl4pPr marL="1371600" indent="0" algn="ctr">
+            <a:lvl4pPr marL="1371566" indent="0" algn="ctr">
               <a:buNone/>
               <a:defRPr>
                 <a:solidFill>
@@ -1289,7 +1309,7 @@
                 </a:solidFill>
               </a:defRPr>
             </a:lvl4pPr>
-            <a:lvl5pPr marL="1828800" indent="0" algn="ctr">
+            <a:lvl5pPr marL="1828754" indent="0" algn="ctr">
               <a:buNone/>
               <a:defRPr>
                 <a:solidFill>
@@ -1299,7 +1319,7 @@
                 </a:solidFill>
               </a:defRPr>
             </a:lvl5pPr>
-            <a:lvl6pPr marL="2286000" indent="0" algn="ctr">
+            <a:lvl6pPr marL="2285943" indent="0" algn="ctr">
               <a:buNone/>
               <a:defRPr>
                 <a:solidFill>
@@ -1309,7 +1329,7 @@
                 </a:solidFill>
               </a:defRPr>
             </a:lvl6pPr>
-            <a:lvl7pPr marL="2743200" indent="0" algn="ctr">
+            <a:lvl7pPr marL="2743131" indent="0" algn="ctr">
               <a:buNone/>
               <a:defRPr>
                 <a:solidFill>
@@ -1319,7 +1339,7 @@
                 </a:solidFill>
               </a:defRPr>
             </a:lvl7pPr>
-            <a:lvl8pPr marL="3200400" indent="0" algn="ctr">
+            <a:lvl8pPr marL="3200320" indent="0" algn="ctr">
               <a:buNone/>
               <a:defRPr>
                 <a:solidFill>
@@ -1329,7 +1349,7 @@
                 </a:solidFill>
               </a:defRPr>
             </a:lvl8pPr>
-            <a:lvl9pPr marL="3657600" indent="0" algn="ctr">
+            <a:lvl9pPr marL="3657509" indent="0" algn="ctr">
               <a:buNone/>
               <a:defRPr>
                 <a:solidFill>
@@ -1370,7 +1390,7 @@
         </p:blipFill>
         <p:spPr>
           <a:xfrm>
-            <a:off x="9758363" y="-14698"/>
+            <a:off x="9758364" y="-14698"/>
             <a:ext cx="2433637" cy="6898640"/>
           </a:xfrm>
           <a:prstGeom prst="rect">
@@ -1404,7 +1424,7 @@
         </p:blipFill>
         <p:spPr>
           <a:xfrm>
-            <a:off x="842749" y="749755"/>
+            <a:off x="842750" y="749757"/>
             <a:ext cx="2320127" cy="697379"/>
           </a:xfrm>
           <a:prstGeom prst="rect">
@@ -1454,7 +1474,7 @@
         </p:nvSpPr>
         <p:spPr>
           <a:xfrm>
-            <a:off x="609600" y="195072"/>
+            <a:off x="609600" y="195074"/>
             <a:ext cx="10972800" cy="1158241"/>
           </a:xfrm>
         </p:spPr>
@@ -1485,7 +1505,7 @@
         </p:nvSpPr>
         <p:spPr>
           <a:xfrm>
-            <a:off x="609600" y="1472185"/>
+            <a:off x="609600" y="1472186"/>
             <a:ext cx="5384800" cy="4129963"/>
           </a:xfrm>
         </p:spPr>
@@ -1550,7 +1570,7 @@
         </p:nvSpPr>
         <p:spPr>
           <a:xfrm>
-            <a:off x="6197600" y="1472185"/>
+            <a:off x="6197600" y="1472186"/>
             <a:ext cx="5384800" cy="4129963"/>
           </a:xfrm>
         </p:spPr>
@@ -1615,7 +1635,7 @@
         </p:nvSpPr>
         <p:spPr>
           <a:xfrm>
-            <a:off x="609600" y="5602148"/>
+            <a:off x="609600" y="5602150"/>
             <a:ext cx="10972800" cy="590691"/>
           </a:xfrm>
         </p:spPr>
@@ -1632,19 +1652,19 @@
                 </a:solidFill>
               </a:defRPr>
             </a:lvl1pPr>
-            <a:lvl2pPr marL="457200" indent="0">
+            <a:lvl2pPr marL="457189" indent="0">
               <a:buNone/>
               <a:defRPr sz="1400"/>
             </a:lvl2pPr>
-            <a:lvl3pPr marL="914400" indent="0">
+            <a:lvl3pPr marL="914377" indent="0">
               <a:buNone/>
               <a:defRPr sz="1400"/>
             </a:lvl3pPr>
-            <a:lvl4pPr marL="1371600" indent="0">
+            <a:lvl4pPr marL="1371566" indent="0">
               <a:buNone/>
               <a:defRPr sz="1400"/>
             </a:lvl4pPr>
-            <a:lvl5pPr marL="1828800" indent="0">
+            <a:lvl5pPr marL="1828754" indent="0">
               <a:buNone/>
               <a:defRPr sz="1400"/>
             </a:lvl5pPr>
@@ -1670,7 +1690,7 @@
         </p:nvSpPr>
         <p:spPr>
           <a:xfrm>
-            <a:off x="609599" y="6446570"/>
+            <a:off x="609601" y="6446572"/>
             <a:ext cx="9663113" cy="222323"/>
           </a:xfrm>
           <a:prstGeom prst="rect">
@@ -1681,7 +1701,7 @@
           <a:bodyPr vert="horz" lIns="91440" tIns="45720" rIns="91440" bIns="45720" rtlCol="0" anchor="t"/>
           <a:lstStyle>
             <a:lvl1pPr algn="l">
-              <a:defRPr sz="1100" kern="700" cap="small" spc="50" baseline="0">
+              <a:defRPr sz="1100" kern="700" cap="small" spc="51" baseline="0">
                 <a:solidFill>
                   <a:schemeClr val="tx1">
                     <a:lumMod val="50000"/>
@@ -1708,7 +1728,7 @@
         </p:nvSpPr>
         <p:spPr>
           <a:xfrm>
-            <a:off x="10446059" y="6446570"/>
+            <a:off x="10446060" y="6446572"/>
             <a:ext cx="1136341" cy="222323"/>
           </a:xfrm>
           <a:prstGeom prst="rect">
@@ -1780,7 +1800,7 @@
         </p:nvSpPr>
         <p:spPr>
           <a:xfrm>
-            <a:off x="609600" y="195071"/>
+            <a:off x="609600" y="195073"/>
             <a:ext cx="10972800" cy="1158241"/>
           </a:xfrm>
         </p:spPr>
@@ -1824,35 +1844,35 @@
               <a:buNone/>
               <a:defRPr sz="2200" b="1"/>
             </a:lvl1pPr>
-            <a:lvl2pPr marL="457200" indent="0">
+            <a:lvl2pPr marL="457189" indent="0">
               <a:buNone/>
               <a:defRPr sz="2000" b="1"/>
             </a:lvl2pPr>
-            <a:lvl3pPr marL="914400" indent="0">
+            <a:lvl3pPr marL="914377" indent="0">
               <a:buNone/>
               <a:defRPr sz="1800" b="1"/>
             </a:lvl3pPr>
-            <a:lvl4pPr marL="1371600" indent="0">
+            <a:lvl4pPr marL="1371566" indent="0">
               <a:buNone/>
               <a:defRPr sz="1600" b="1"/>
             </a:lvl4pPr>
-            <a:lvl5pPr marL="1828800" indent="0">
+            <a:lvl5pPr marL="1828754" indent="0">
               <a:buNone/>
               <a:defRPr sz="1600" b="1"/>
             </a:lvl5pPr>
-            <a:lvl6pPr marL="2286000" indent="0">
+            <a:lvl6pPr marL="2285943" indent="0">
               <a:buNone/>
               <a:defRPr sz="1600" b="1"/>
             </a:lvl6pPr>
-            <a:lvl7pPr marL="2743200" indent="0">
+            <a:lvl7pPr marL="2743131" indent="0">
               <a:buNone/>
               <a:defRPr sz="1600" b="1"/>
             </a:lvl7pPr>
-            <a:lvl8pPr marL="3200400" indent="0">
+            <a:lvl8pPr marL="3200320" indent="0">
               <a:buNone/>
               <a:defRPr sz="1600" b="1"/>
             </a:lvl8pPr>
-            <a:lvl9pPr marL="3657600" indent="0">
+            <a:lvl9pPr marL="3657509" indent="0">
               <a:buNone/>
               <a:defRPr sz="1600" b="1"/>
             </a:lvl9pPr>
@@ -1878,7 +1898,7 @@
         </p:nvSpPr>
         <p:spPr>
           <a:xfrm>
-            <a:off x="609600" y="1911098"/>
+            <a:off x="609600" y="1911100"/>
             <a:ext cx="5386917" cy="4279391"/>
           </a:xfrm>
         </p:spPr>
@@ -1943,7 +1963,7 @@
         </p:nvSpPr>
         <p:spPr>
           <a:xfrm>
-            <a:off x="6193368" y="1472185"/>
+            <a:off x="6193369" y="1472185"/>
             <a:ext cx="5389033" cy="438912"/>
           </a:xfrm>
         </p:spPr>
@@ -1956,35 +1976,35 @@
               <a:buNone/>
               <a:defRPr sz="2200" b="1"/>
             </a:lvl1pPr>
-            <a:lvl2pPr marL="457200" indent="0">
+            <a:lvl2pPr marL="457189" indent="0">
               <a:buNone/>
               <a:defRPr sz="2000" b="1"/>
             </a:lvl2pPr>
-            <a:lvl3pPr marL="914400" indent="0">
+            <a:lvl3pPr marL="914377" indent="0">
               <a:buNone/>
               <a:defRPr sz="1800" b="1"/>
             </a:lvl3pPr>
-            <a:lvl4pPr marL="1371600" indent="0">
+            <a:lvl4pPr marL="1371566" indent="0">
               <a:buNone/>
               <a:defRPr sz="1600" b="1"/>
             </a:lvl4pPr>
-            <a:lvl5pPr marL="1828800" indent="0">
+            <a:lvl5pPr marL="1828754" indent="0">
               <a:buNone/>
               <a:defRPr sz="1600" b="1"/>
             </a:lvl5pPr>
-            <a:lvl6pPr marL="2286000" indent="0">
+            <a:lvl6pPr marL="2285943" indent="0">
               <a:buNone/>
               <a:defRPr sz="1600" b="1"/>
             </a:lvl6pPr>
-            <a:lvl7pPr marL="2743200" indent="0">
+            <a:lvl7pPr marL="2743131" indent="0">
               <a:buNone/>
               <a:defRPr sz="1600" b="1"/>
             </a:lvl7pPr>
-            <a:lvl8pPr marL="3200400" indent="0">
+            <a:lvl8pPr marL="3200320" indent="0">
               <a:buNone/>
               <a:defRPr sz="1600" b="1"/>
             </a:lvl8pPr>
-            <a:lvl9pPr marL="3657600" indent="0">
+            <a:lvl9pPr marL="3657509" indent="0">
               <a:buNone/>
               <a:defRPr sz="1600" b="1"/>
             </a:lvl9pPr>
@@ -2010,7 +2030,7 @@
         </p:nvSpPr>
         <p:spPr>
           <a:xfrm>
-            <a:off x="6193368" y="1911098"/>
+            <a:off x="6193369" y="1911100"/>
             <a:ext cx="5389033" cy="4279391"/>
           </a:xfrm>
         </p:spPr>
@@ -2075,7 +2095,7 @@
         </p:nvSpPr>
         <p:spPr>
           <a:xfrm>
-            <a:off x="609599" y="6446570"/>
+            <a:off x="609601" y="6446572"/>
             <a:ext cx="9663113" cy="222323"/>
           </a:xfrm>
           <a:prstGeom prst="rect">
@@ -2086,7 +2106,7 @@
           <a:bodyPr vert="horz" lIns="91440" tIns="45720" rIns="91440" bIns="45720" rtlCol="0" anchor="t"/>
           <a:lstStyle>
             <a:lvl1pPr algn="l">
-              <a:defRPr sz="1100" kern="700" cap="small" spc="50" baseline="0">
+              <a:defRPr sz="1100" kern="700" cap="small" spc="51" baseline="0">
                 <a:solidFill>
                   <a:schemeClr val="tx1">
                     <a:lumMod val="50000"/>
@@ -2113,7 +2133,7 @@
         </p:nvSpPr>
         <p:spPr>
           <a:xfrm>
-            <a:off x="10446059" y="6446570"/>
+            <a:off x="10446060" y="6446572"/>
             <a:ext cx="1136341" cy="222323"/>
           </a:xfrm>
           <a:prstGeom prst="rect">
@@ -2185,7 +2205,7 @@
         </p:nvSpPr>
         <p:spPr>
           <a:xfrm>
-            <a:off x="609600" y="195072"/>
+            <a:off x="609600" y="195074"/>
             <a:ext cx="10972800" cy="1142629"/>
           </a:xfrm>
         </p:spPr>
@@ -2216,7 +2236,7 @@
         </p:nvSpPr>
         <p:spPr>
           <a:xfrm>
-            <a:off x="7776519" y="1474574"/>
+            <a:off x="7776519" y="1474576"/>
             <a:ext cx="3805880" cy="3456937"/>
           </a:xfrm>
         </p:spPr>
@@ -2279,7 +2299,7 @@
         </p:nvSpPr>
         <p:spPr>
           <a:xfrm>
-            <a:off x="609598" y="1474574"/>
+            <a:off x="609599" y="1474576"/>
             <a:ext cx="6862765" cy="4651591"/>
           </a:xfrm>
         </p:spPr>
@@ -2344,7 +2364,7 @@
         </p:nvSpPr>
         <p:spPr>
           <a:xfrm>
-            <a:off x="7776519" y="5129452"/>
+            <a:off x="7776519" y="5129454"/>
             <a:ext cx="3805880" cy="996713"/>
           </a:xfrm>
         </p:spPr>
@@ -2410,7 +2430,7 @@
         </p:nvSpPr>
         <p:spPr>
           <a:xfrm>
-            <a:off x="7776518" y="4931511"/>
+            <a:off x="7776520" y="4931513"/>
             <a:ext cx="3805881" cy="197941"/>
           </a:xfrm>
           <a:ln>
@@ -2432,19 +2452,19 @@
                 </a:solidFill>
               </a:defRPr>
             </a:lvl1pPr>
-            <a:lvl2pPr marL="457200" indent="0">
+            <a:lvl2pPr marL="457189" indent="0">
               <a:buNone/>
               <a:defRPr sz="1400"/>
             </a:lvl2pPr>
-            <a:lvl3pPr marL="914400" indent="0">
+            <a:lvl3pPr marL="914377" indent="0">
               <a:buNone/>
               <a:defRPr sz="1400"/>
             </a:lvl3pPr>
-            <a:lvl4pPr marL="1371600" indent="0">
+            <a:lvl4pPr marL="1371566" indent="0">
               <a:buNone/>
               <a:defRPr sz="1400"/>
             </a:lvl4pPr>
-            <a:lvl5pPr marL="1828800" indent="0">
+            <a:lvl5pPr marL="1828754" indent="0">
               <a:buNone/>
               <a:defRPr sz="1400"/>
             </a:lvl5pPr>
@@ -2470,7 +2490,7 @@
         </p:nvSpPr>
         <p:spPr>
           <a:xfrm>
-            <a:off x="609599" y="6446570"/>
+            <a:off x="609601" y="6446572"/>
             <a:ext cx="9663113" cy="222323"/>
           </a:xfrm>
           <a:prstGeom prst="rect">
@@ -2481,7 +2501,7 @@
           <a:bodyPr vert="horz" lIns="91440" tIns="45720" rIns="91440" bIns="45720" rtlCol="0" anchor="t"/>
           <a:lstStyle>
             <a:lvl1pPr algn="l">
-              <a:defRPr sz="1100" kern="700" cap="small" spc="50" baseline="0">
+              <a:defRPr sz="1100" kern="700" cap="small" spc="51" baseline="0">
                 <a:solidFill>
                   <a:schemeClr val="tx1">
                     <a:lumMod val="50000"/>
@@ -2508,7 +2528,7 @@
         </p:nvSpPr>
         <p:spPr>
           <a:xfrm>
-            <a:off x="10446059" y="6446570"/>
+            <a:off x="10446060" y="6446572"/>
             <a:ext cx="1136341" cy="222323"/>
           </a:xfrm>
           <a:prstGeom prst="rect">
@@ -2580,7 +2600,7 @@
         </p:nvSpPr>
         <p:spPr>
           <a:xfrm>
-            <a:off x="609599" y="195072"/>
+            <a:off x="609599" y="195074"/>
             <a:ext cx="10972800" cy="1164171"/>
           </a:xfrm>
         </p:spPr>
@@ -2681,7 +2701,7 @@
         </p:nvSpPr>
         <p:spPr>
           <a:xfrm>
-            <a:off x="609601" y="1474574"/>
+            <a:off x="609602" y="1474574"/>
             <a:ext cx="3805881" cy="3456936"/>
           </a:xfrm>
         </p:spPr>
@@ -2740,7 +2760,7 @@
         </p:nvSpPr>
         <p:spPr>
           <a:xfrm>
-            <a:off x="609601" y="5129452"/>
+            <a:off x="609602" y="5129454"/>
             <a:ext cx="3805881" cy="996713"/>
           </a:xfrm>
         </p:spPr>
@@ -2803,7 +2823,7 @@
         </p:nvSpPr>
         <p:spPr>
           <a:xfrm>
-            <a:off x="609600" y="4931511"/>
+            <a:off x="609601" y="4931513"/>
             <a:ext cx="3805883" cy="197941"/>
           </a:xfrm>
           <a:ln>
@@ -2825,19 +2845,19 @@
                 </a:solidFill>
               </a:defRPr>
             </a:lvl1pPr>
-            <a:lvl2pPr marL="457200" indent="0">
+            <a:lvl2pPr marL="457189" indent="0">
               <a:buNone/>
               <a:defRPr sz="1400"/>
             </a:lvl2pPr>
-            <a:lvl3pPr marL="914400" indent="0">
+            <a:lvl3pPr marL="914377" indent="0">
               <a:buNone/>
               <a:defRPr sz="1400"/>
             </a:lvl3pPr>
-            <a:lvl4pPr marL="1371600" indent="0">
+            <a:lvl4pPr marL="1371566" indent="0">
               <a:buNone/>
               <a:defRPr sz="1400"/>
             </a:lvl4pPr>
-            <a:lvl5pPr marL="1828800" indent="0">
+            <a:lvl5pPr marL="1828754" indent="0">
               <a:buNone/>
               <a:defRPr sz="1400"/>
             </a:lvl5pPr>
@@ -2863,7 +2883,7 @@
         </p:nvSpPr>
         <p:spPr>
           <a:xfrm>
-            <a:off x="609599" y="6446570"/>
+            <a:off x="609601" y="6446572"/>
             <a:ext cx="9663113" cy="222323"/>
           </a:xfrm>
           <a:prstGeom prst="rect">
@@ -2874,7 +2894,7 @@
           <a:bodyPr vert="horz" lIns="91440" tIns="45720" rIns="91440" bIns="45720" rtlCol="0" anchor="t"/>
           <a:lstStyle>
             <a:lvl1pPr algn="l">
-              <a:defRPr sz="1100" kern="700" cap="small" spc="50" baseline="0">
+              <a:defRPr sz="1100" kern="700" cap="small" spc="51" baseline="0">
                 <a:solidFill>
                   <a:schemeClr val="tx1">
                     <a:lumMod val="50000"/>
@@ -2901,7 +2921,7 @@
         </p:nvSpPr>
         <p:spPr>
           <a:xfrm>
-            <a:off x="10446059" y="6446570"/>
+            <a:off x="10446060" y="6446572"/>
             <a:ext cx="1136341" cy="222323"/>
           </a:xfrm>
           <a:prstGeom prst="rect">
@@ -2973,7 +2993,7 @@
         </p:nvSpPr>
         <p:spPr>
           <a:xfrm>
-            <a:off x="609600" y="195071"/>
+            <a:off x="609600" y="195073"/>
             <a:ext cx="10972800" cy="1158241"/>
           </a:xfrm>
         </p:spPr>
@@ -3004,7 +3024,7 @@
         </p:nvSpPr>
         <p:spPr>
           <a:xfrm>
-            <a:off x="7790687" y="1484903"/>
+            <a:off x="7790689" y="1484903"/>
             <a:ext cx="3791711" cy="4439158"/>
           </a:xfrm>
         </p:spPr>
@@ -3063,7 +3083,7 @@
         </p:nvSpPr>
         <p:spPr>
           <a:xfrm>
-            <a:off x="609600" y="1484904"/>
+            <a:off x="609601" y="1484904"/>
             <a:ext cx="6862764" cy="4637099"/>
           </a:xfrm>
         </p:spPr>
@@ -3128,7 +3148,7 @@
         </p:nvSpPr>
         <p:spPr>
           <a:xfrm>
-            <a:off x="7790687" y="5924062"/>
+            <a:off x="7790687" y="5924064"/>
             <a:ext cx="3791712" cy="197941"/>
           </a:xfrm>
           <a:ln>
@@ -3150,19 +3170,19 @@
                 </a:solidFill>
               </a:defRPr>
             </a:lvl1pPr>
-            <a:lvl2pPr marL="457200" indent="0">
+            <a:lvl2pPr marL="457189" indent="0">
               <a:buNone/>
               <a:defRPr sz="1400"/>
             </a:lvl2pPr>
-            <a:lvl3pPr marL="914400" indent="0">
+            <a:lvl3pPr marL="914377" indent="0">
               <a:buNone/>
               <a:defRPr sz="1400"/>
             </a:lvl3pPr>
-            <a:lvl4pPr marL="1371600" indent="0">
+            <a:lvl4pPr marL="1371566" indent="0">
               <a:buNone/>
               <a:defRPr sz="1400"/>
             </a:lvl4pPr>
-            <a:lvl5pPr marL="1828800" indent="0">
+            <a:lvl5pPr marL="1828754" indent="0">
               <a:buNone/>
               <a:defRPr sz="1400"/>
             </a:lvl5pPr>
@@ -3188,7 +3208,7 @@
         </p:nvSpPr>
         <p:spPr>
           <a:xfrm>
-            <a:off x="609599" y="6446570"/>
+            <a:off x="609601" y="6446572"/>
             <a:ext cx="9663113" cy="222323"/>
           </a:xfrm>
           <a:prstGeom prst="rect">
@@ -3199,7 +3219,7 @@
           <a:bodyPr vert="horz" lIns="91440" tIns="45720" rIns="91440" bIns="45720" rtlCol="0" anchor="t"/>
           <a:lstStyle>
             <a:lvl1pPr algn="l">
-              <a:defRPr sz="1100" kern="700" cap="small" spc="50" baseline="0">
+              <a:defRPr sz="1100" kern="700" cap="small" spc="51" baseline="0">
                 <a:solidFill>
                   <a:schemeClr val="tx1">
                     <a:lumMod val="50000"/>
@@ -3226,7 +3246,7 @@
         </p:nvSpPr>
         <p:spPr>
           <a:xfrm>
-            <a:off x="10446059" y="6446570"/>
+            <a:off x="10446060" y="6446572"/>
             <a:ext cx="1136341" cy="222323"/>
           </a:xfrm>
           <a:prstGeom prst="rect">
@@ -3298,7 +3318,7 @@
         </p:nvSpPr>
         <p:spPr>
           <a:xfrm>
-            <a:off x="609600" y="195071"/>
+            <a:off x="609600" y="195073"/>
             <a:ext cx="10972800" cy="1164173"/>
           </a:xfrm>
         </p:spPr>
@@ -3329,7 +3349,7 @@
         </p:nvSpPr>
         <p:spPr>
           <a:xfrm>
-            <a:off x="609600" y="1474574"/>
+            <a:off x="609601" y="1474576"/>
             <a:ext cx="3791713" cy="4449487"/>
           </a:xfrm>
         </p:spPr>
@@ -3388,7 +3408,7 @@
         </p:nvSpPr>
         <p:spPr>
           <a:xfrm>
-            <a:off x="4700588" y="1474574"/>
+            <a:off x="4700589" y="1474576"/>
             <a:ext cx="6881812" cy="4647429"/>
           </a:xfrm>
         </p:spPr>
@@ -3453,7 +3473,7 @@
         </p:nvSpPr>
         <p:spPr>
           <a:xfrm>
-            <a:off x="609599" y="5924062"/>
+            <a:off x="609600" y="5924064"/>
             <a:ext cx="3791715" cy="197941"/>
           </a:xfrm>
           <a:ln>
@@ -3475,19 +3495,19 @@
                 </a:solidFill>
               </a:defRPr>
             </a:lvl1pPr>
-            <a:lvl2pPr marL="457200" indent="0">
+            <a:lvl2pPr marL="457189" indent="0">
               <a:buNone/>
               <a:defRPr sz="1400"/>
             </a:lvl2pPr>
-            <a:lvl3pPr marL="914400" indent="0">
+            <a:lvl3pPr marL="914377" indent="0">
               <a:buNone/>
               <a:defRPr sz="1400"/>
             </a:lvl3pPr>
-            <a:lvl4pPr marL="1371600" indent="0">
+            <a:lvl4pPr marL="1371566" indent="0">
               <a:buNone/>
               <a:defRPr sz="1400"/>
             </a:lvl4pPr>
-            <a:lvl5pPr marL="1828800" indent="0">
+            <a:lvl5pPr marL="1828754" indent="0">
               <a:buNone/>
               <a:defRPr sz="1400"/>
             </a:lvl5pPr>
@@ -3513,7 +3533,7 @@
         </p:nvSpPr>
         <p:spPr>
           <a:xfrm>
-            <a:off x="609599" y="6446570"/>
+            <a:off x="609601" y="6446572"/>
             <a:ext cx="9663113" cy="222323"/>
           </a:xfrm>
           <a:prstGeom prst="rect">
@@ -3524,7 +3544,7 @@
           <a:bodyPr vert="horz" lIns="91440" tIns="45720" rIns="91440" bIns="45720" rtlCol="0" anchor="t"/>
           <a:lstStyle>
             <a:lvl1pPr algn="l">
-              <a:defRPr sz="1100" kern="700" cap="small" spc="50" baseline="0">
+              <a:defRPr sz="1100" kern="700" cap="small" spc="51" baseline="0">
                 <a:solidFill>
                   <a:schemeClr val="tx1">
                     <a:lumMod val="50000"/>
@@ -3551,7 +3571,7 @@
         </p:nvSpPr>
         <p:spPr>
           <a:xfrm>
-            <a:off x="10446059" y="6446570"/>
+            <a:off x="10446060" y="6446572"/>
             <a:ext cx="1136341" cy="222323"/>
           </a:xfrm>
           <a:prstGeom prst="rect">
@@ -3623,7 +3643,7 @@
         </p:nvSpPr>
         <p:spPr>
           <a:xfrm>
-            <a:off x="609600" y="195072"/>
+            <a:off x="609600" y="195074"/>
             <a:ext cx="10972800" cy="1164171"/>
           </a:xfrm>
         </p:spPr>
@@ -3896,7 +3916,7 @@
         </p:nvSpPr>
         <p:spPr>
           <a:xfrm>
-            <a:off x="609600" y="4351058"/>
+            <a:off x="609601" y="4351060"/>
             <a:ext cx="5330457" cy="197941"/>
           </a:xfrm>
           <a:ln>
@@ -3918,19 +3938,19 @@
                 </a:solidFill>
               </a:defRPr>
             </a:lvl1pPr>
-            <a:lvl2pPr marL="457200" indent="0">
+            <a:lvl2pPr marL="457189" indent="0">
               <a:buNone/>
               <a:defRPr sz="1400"/>
             </a:lvl2pPr>
-            <a:lvl3pPr marL="914400" indent="0">
+            <a:lvl3pPr marL="914377" indent="0">
               <a:buNone/>
               <a:defRPr sz="1400"/>
             </a:lvl3pPr>
-            <a:lvl4pPr marL="1371600" indent="0">
+            <a:lvl4pPr marL="1371566" indent="0">
               <a:buNone/>
               <a:defRPr sz="1400"/>
             </a:lvl4pPr>
-            <a:lvl5pPr marL="1828800" indent="0">
+            <a:lvl5pPr marL="1828754" indent="0">
               <a:buNone/>
               <a:defRPr sz="1400"/>
             </a:lvl5pPr>
@@ -3956,7 +3976,7 @@
         </p:nvSpPr>
         <p:spPr>
           <a:xfrm>
-            <a:off x="6251945" y="4351058"/>
+            <a:off x="6251946" y="4351060"/>
             <a:ext cx="5330457" cy="197941"/>
           </a:xfrm>
           <a:ln>
@@ -3978,19 +3998,19 @@
                 </a:solidFill>
               </a:defRPr>
             </a:lvl1pPr>
-            <a:lvl2pPr marL="457200" indent="0">
+            <a:lvl2pPr marL="457189" indent="0">
               <a:buNone/>
               <a:defRPr sz="1400"/>
             </a:lvl2pPr>
-            <a:lvl3pPr marL="914400" indent="0">
+            <a:lvl3pPr marL="914377" indent="0">
               <a:buNone/>
               <a:defRPr sz="1400"/>
             </a:lvl3pPr>
-            <a:lvl4pPr marL="1371600" indent="0">
+            <a:lvl4pPr marL="1371566" indent="0">
               <a:buNone/>
               <a:defRPr sz="1400"/>
             </a:lvl4pPr>
-            <a:lvl5pPr marL="1828800" indent="0">
+            <a:lvl5pPr marL="1828754" indent="0">
               <a:buNone/>
               <a:defRPr sz="1400"/>
             </a:lvl5pPr>
@@ -4016,7 +4036,7 @@
         </p:nvSpPr>
         <p:spPr>
           <a:xfrm>
-            <a:off x="609599" y="6446570"/>
+            <a:off x="609601" y="6446572"/>
             <a:ext cx="9663113" cy="222323"/>
           </a:xfrm>
           <a:prstGeom prst="rect">
@@ -4027,7 +4047,7 @@
           <a:bodyPr vert="horz" lIns="91440" tIns="45720" rIns="91440" bIns="45720" rtlCol="0" anchor="t"/>
           <a:lstStyle>
             <a:lvl1pPr algn="l">
-              <a:defRPr sz="1100" kern="700" cap="small" spc="50" baseline="0">
+              <a:defRPr sz="1100" kern="700" cap="small" spc="51" baseline="0">
                 <a:solidFill>
                   <a:schemeClr val="tx1">
                     <a:lumMod val="50000"/>
@@ -4054,7 +4074,7 @@
         </p:nvSpPr>
         <p:spPr>
           <a:xfrm>
-            <a:off x="10446059" y="6446570"/>
+            <a:off x="10446060" y="6446572"/>
             <a:ext cx="1136341" cy="222323"/>
           </a:xfrm>
           <a:prstGeom prst="rect">
@@ -4173,7 +4193,7 @@
         </p:blipFill>
         <p:spPr>
           <a:xfrm>
-            <a:off x="9277627" y="4733"/>
+            <a:off x="9277628" y="4733"/>
             <a:ext cx="2914373" cy="6858000"/>
           </a:xfrm>
           <a:prstGeom prst="rect">
@@ -4197,7 +4217,7 @@
         </p:nvSpPr>
         <p:spPr>
           <a:xfrm>
-            <a:off x="316992" y="6567964"/>
+            <a:off x="316993" y="6567966"/>
             <a:ext cx="5330457" cy="197941"/>
           </a:xfrm>
           <a:ln>
@@ -4217,19 +4237,19 @@
                 </a:solidFill>
               </a:defRPr>
             </a:lvl1pPr>
-            <a:lvl2pPr marL="457200" indent="0">
+            <a:lvl2pPr marL="457189" indent="0">
               <a:buNone/>
               <a:defRPr sz="1400"/>
             </a:lvl2pPr>
-            <a:lvl3pPr marL="914400" indent="0">
+            <a:lvl3pPr marL="914377" indent="0">
               <a:buNone/>
               <a:defRPr sz="1400"/>
             </a:lvl3pPr>
-            <a:lvl4pPr marL="1371600" indent="0">
+            <a:lvl4pPr marL="1371566" indent="0">
               <a:buNone/>
               <a:defRPr sz="1400"/>
             </a:lvl4pPr>
-            <a:lvl5pPr marL="1828800" indent="0">
+            <a:lvl5pPr marL="1828754" indent="0">
               <a:buNone/>
               <a:defRPr sz="1400"/>
             </a:lvl5pPr>
@@ -4312,7 +4332,7 @@
         </p:nvSpPr>
         <p:spPr>
           <a:xfrm>
-            <a:off x="609599" y="6446570"/>
+            <a:off x="609601" y="6446572"/>
             <a:ext cx="9663113" cy="222323"/>
           </a:xfrm>
           <a:prstGeom prst="rect">
@@ -4323,7 +4343,7 @@
           <a:bodyPr vert="horz" lIns="91440" tIns="45720" rIns="91440" bIns="45720" rtlCol="0" anchor="t"/>
           <a:lstStyle>
             <a:lvl1pPr algn="l">
-              <a:defRPr sz="1100" kern="700" cap="small" spc="50" baseline="0">
+              <a:defRPr sz="1100" kern="700" cap="small" spc="51" baseline="0">
                 <a:solidFill>
                   <a:schemeClr val="tx1">
                     <a:lumMod val="50000"/>
@@ -4350,7 +4370,7 @@
         </p:nvSpPr>
         <p:spPr>
           <a:xfrm>
-            <a:off x="10446059" y="6446570"/>
+            <a:off x="10446060" y="6446572"/>
             <a:ext cx="1136341" cy="222323"/>
           </a:xfrm>
           <a:prstGeom prst="rect">
@@ -4418,7 +4438,7 @@
         </p:nvSpPr>
         <p:spPr>
           <a:xfrm>
-            <a:off x="0" y="6941"/>
+            <a:off x="0" y="6943"/>
             <a:ext cx="12192000" cy="2081861"/>
           </a:xfrm>
           <a:prstGeom prst="rect">
@@ -4498,7 +4518,7 @@
         </p:nvSpPr>
         <p:spPr>
           <a:xfrm>
-            <a:off x="0" y="13878"/>
+            <a:off x="0" y="13880"/>
             <a:ext cx="12192000" cy="6851061"/>
           </a:xfrm>
           <a:prstGeom prst="rect">
@@ -4547,7 +4567,7 @@
         </p:nvSpPr>
         <p:spPr>
           <a:xfrm>
-            <a:off x="842749" y="2553629"/>
+            <a:off x="842750" y="2553631"/>
             <a:ext cx="8638217" cy="1470025"/>
           </a:xfrm>
         </p:spPr>
@@ -4583,7 +4603,7 @@
         </p:nvSpPr>
         <p:spPr>
           <a:xfrm>
-            <a:off x="846025" y="4406548"/>
+            <a:off x="846026" y="4406548"/>
             <a:ext cx="8638217" cy="1752600"/>
           </a:xfrm>
         </p:spPr>
@@ -4603,7 +4623,7 @@
                 </a:solidFill>
               </a:defRPr>
             </a:lvl1pPr>
-            <a:lvl2pPr marL="457200" indent="0" algn="ctr">
+            <a:lvl2pPr marL="457189" indent="0" algn="ctr">
               <a:buNone/>
               <a:defRPr>
                 <a:solidFill>
@@ -4613,7 +4633,7 @@
                 </a:solidFill>
               </a:defRPr>
             </a:lvl2pPr>
-            <a:lvl3pPr marL="914400" indent="0" algn="ctr">
+            <a:lvl3pPr marL="914377" indent="0" algn="ctr">
               <a:buNone/>
               <a:defRPr>
                 <a:solidFill>
@@ -4623,7 +4643,7 @@
                 </a:solidFill>
               </a:defRPr>
             </a:lvl3pPr>
-            <a:lvl4pPr marL="1371600" indent="0" algn="ctr">
+            <a:lvl4pPr marL="1371566" indent="0" algn="ctr">
               <a:buNone/>
               <a:defRPr>
                 <a:solidFill>
@@ -4633,7 +4653,7 @@
                 </a:solidFill>
               </a:defRPr>
             </a:lvl4pPr>
-            <a:lvl5pPr marL="1828800" indent="0" algn="ctr">
+            <a:lvl5pPr marL="1828754" indent="0" algn="ctr">
               <a:buNone/>
               <a:defRPr>
                 <a:solidFill>
@@ -4643,7 +4663,7 @@
                 </a:solidFill>
               </a:defRPr>
             </a:lvl5pPr>
-            <a:lvl6pPr marL="2286000" indent="0" algn="ctr">
+            <a:lvl6pPr marL="2285943" indent="0" algn="ctr">
               <a:buNone/>
               <a:defRPr>
                 <a:solidFill>
@@ -4653,7 +4673,7 @@
                 </a:solidFill>
               </a:defRPr>
             </a:lvl6pPr>
-            <a:lvl7pPr marL="2743200" indent="0" algn="ctr">
+            <a:lvl7pPr marL="2743131" indent="0" algn="ctr">
               <a:buNone/>
               <a:defRPr>
                 <a:solidFill>
@@ -4663,7 +4683,7 @@
                 </a:solidFill>
               </a:defRPr>
             </a:lvl7pPr>
-            <a:lvl8pPr marL="3200400" indent="0" algn="ctr">
+            <a:lvl8pPr marL="3200320" indent="0" algn="ctr">
               <a:buNone/>
               <a:defRPr>
                 <a:solidFill>
@@ -4673,7 +4693,7 @@
                 </a:solidFill>
               </a:defRPr>
             </a:lvl8pPr>
-            <a:lvl9pPr marL="3657600" indent="0" algn="ctr">
+            <a:lvl9pPr marL="3657509" indent="0" algn="ctr">
               <a:buNone/>
               <a:defRPr>
                 <a:solidFill>
@@ -4705,7 +4725,7 @@
         </p:nvSpPr>
         <p:spPr>
           <a:xfrm>
-            <a:off x="3751272" y="757430"/>
+            <a:off x="3751273" y="757430"/>
             <a:ext cx="2649531" cy="544513"/>
           </a:xfrm>
         </p:spPr>
@@ -4760,7 +4780,7 @@
         </p:blipFill>
         <p:spPr>
           <a:xfrm>
-            <a:off x="9758363" y="-14698"/>
+            <a:off x="9758364" y="-14698"/>
             <a:ext cx="2433637" cy="6898640"/>
           </a:xfrm>
           <a:prstGeom prst="rect">
@@ -4794,7 +4814,7 @@
         </p:blipFill>
         <p:spPr>
           <a:xfrm>
-            <a:off x="842749" y="749755"/>
+            <a:off x="842750" y="749757"/>
             <a:ext cx="2320127" cy="697379"/>
           </a:xfrm>
           <a:prstGeom prst="rect">
@@ -4932,7 +4952,7 @@
         </p:nvSpPr>
         <p:spPr>
           <a:xfrm>
-            <a:off x="0" y="13878"/>
+            <a:off x="0" y="13880"/>
             <a:ext cx="12192000" cy="6851061"/>
           </a:xfrm>
           <a:prstGeom prst="rect">
@@ -4981,7 +5001,7 @@
         </p:nvSpPr>
         <p:spPr>
           <a:xfrm>
-            <a:off x="842749" y="2553629"/>
+            <a:off x="842750" y="2553631"/>
             <a:ext cx="8638217" cy="1470025"/>
           </a:xfrm>
         </p:spPr>
@@ -5017,7 +5037,7 @@
         </p:nvSpPr>
         <p:spPr>
           <a:xfrm>
-            <a:off x="846025" y="4406548"/>
+            <a:off x="846026" y="4406548"/>
             <a:ext cx="8638217" cy="1526892"/>
           </a:xfrm>
         </p:spPr>
@@ -5037,7 +5057,7 @@
                 </a:solidFill>
               </a:defRPr>
             </a:lvl1pPr>
-            <a:lvl2pPr marL="457200" indent="0" algn="ctr">
+            <a:lvl2pPr marL="457189" indent="0" algn="ctr">
               <a:buNone/>
               <a:defRPr>
                 <a:solidFill>
@@ -5047,7 +5067,7 @@
                 </a:solidFill>
               </a:defRPr>
             </a:lvl2pPr>
-            <a:lvl3pPr marL="914400" indent="0" algn="ctr">
+            <a:lvl3pPr marL="914377" indent="0" algn="ctr">
               <a:buNone/>
               <a:defRPr>
                 <a:solidFill>
@@ -5057,7 +5077,7 @@
                 </a:solidFill>
               </a:defRPr>
             </a:lvl3pPr>
-            <a:lvl4pPr marL="1371600" indent="0" algn="ctr">
+            <a:lvl4pPr marL="1371566" indent="0" algn="ctr">
               <a:buNone/>
               <a:defRPr>
                 <a:solidFill>
@@ -5067,7 +5087,7 @@
                 </a:solidFill>
               </a:defRPr>
             </a:lvl4pPr>
-            <a:lvl5pPr marL="1828800" indent="0" algn="ctr">
+            <a:lvl5pPr marL="1828754" indent="0" algn="ctr">
               <a:buNone/>
               <a:defRPr>
                 <a:solidFill>
@@ -5077,7 +5097,7 @@
                 </a:solidFill>
               </a:defRPr>
             </a:lvl5pPr>
-            <a:lvl6pPr marL="2286000" indent="0" algn="ctr">
+            <a:lvl6pPr marL="2285943" indent="0" algn="ctr">
               <a:buNone/>
               <a:defRPr>
                 <a:solidFill>
@@ -5087,7 +5107,7 @@
                 </a:solidFill>
               </a:defRPr>
             </a:lvl6pPr>
-            <a:lvl7pPr marL="2743200" indent="0" algn="ctr">
+            <a:lvl7pPr marL="2743131" indent="0" algn="ctr">
               <a:buNone/>
               <a:defRPr>
                 <a:solidFill>
@@ -5097,7 +5117,7 @@
                 </a:solidFill>
               </a:defRPr>
             </a:lvl7pPr>
-            <a:lvl8pPr marL="3200400" indent="0" algn="ctr">
+            <a:lvl8pPr marL="3200320" indent="0" algn="ctr">
               <a:buNone/>
               <a:defRPr>
                 <a:solidFill>
@@ -5107,7 +5127,7 @@
                 </a:solidFill>
               </a:defRPr>
             </a:lvl8pPr>
-            <a:lvl9pPr marL="3657600" indent="0" algn="ctr">
+            <a:lvl9pPr marL="3657509" indent="0" algn="ctr">
               <a:buNone/>
               <a:defRPr>
                 <a:solidFill>
@@ -5139,7 +5159,7 @@
         </p:nvSpPr>
         <p:spPr>
           <a:xfrm>
-            <a:off x="3751272" y="825215"/>
+            <a:off x="3751273" y="825217"/>
             <a:ext cx="2649531" cy="544513"/>
           </a:xfrm>
         </p:spPr>
@@ -5185,7 +5205,7 @@
         </p:nvSpPr>
         <p:spPr>
           <a:xfrm>
-            <a:off x="854940" y="6014764"/>
+            <a:off x="854941" y="6014764"/>
             <a:ext cx="2649531" cy="548640"/>
           </a:xfrm>
         </p:spPr>
@@ -5224,7 +5244,7 @@
         </p:nvSpPr>
         <p:spPr>
           <a:xfrm>
-            <a:off x="3837091" y="6014764"/>
+            <a:off x="3837092" y="6014764"/>
             <a:ext cx="2649531" cy="548640"/>
           </a:xfrm>
         </p:spPr>
@@ -5311,7 +5331,7 @@
         </p:blipFill>
         <p:spPr>
           <a:xfrm>
-            <a:off x="9758363" y="-14698"/>
+            <a:off x="9758364" y="-14698"/>
             <a:ext cx="2433637" cy="6898640"/>
           </a:xfrm>
           <a:prstGeom prst="rect">
@@ -5345,7 +5365,7 @@
         </p:blipFill>
         <p:spPr>
           <a:xfrm>
-            <a:off x="842749" y="749755"/>
+            <a:off x="842750" y="749757"/>
             <a:ext cx="2320127" cy="697379"/>
           </a:xfrm>
           <a:prstGeom prst="rect">
@@ -5479,7 +5499,7 @@
         </p:nvSpPr>
         <p:spPr>
           <a:xfrm>
-            <a:off x="862793" y="4500566"/>
+            <a:off x="862793" y="4500568"/>
             <a:ext cx="8607272" cy="1646235"/>
           </a:xfrm>
           <a:noFill/>
@@ -5500,7 +5520,7 @@
                 </a:solidFill>
               </a:defRPr>
             </a:lvl1pPr>
-            <a:lvl2pPr marL="457200" indent="0" algn="ctr">
+            <a:lvl2pPr marL="457189" indent="0" algn="ctr">
               <a:buNone/>
               <a:defRPr>
                 <a:solidFill>
@@ -5510,7 +5530,7 @@
                 </a:solidFill>
               </a:defRPr>
             </a:lvl2pPr>
-            <a:lvl3pPr marL="914400" indent="0" algn="ctr">
+            <a:lvl3pPr marL="914377" indent="0" algn="ctr">
               <a:buNone/>
               <a:defRPr>
                 <a:solidFill>
@@ -5520,7 +5540,7 @@
                 </a:solidFill>
               </a:defRPr>
             </a:lvl3pPr>
-            <a:lvl4pPr marL="1371600" indent="0" algn="ctr">
+            <a:lvl4pPr marL="1371566" indent="0" algn="ctr">
               <a:buNone/>
               <a:defRPr>
                 <a:solidFill>
@@ -5530,7 +5550,7 @@
                 </a:solidFill>
               </a:defRPr>
             </a:lvl4pPr>
-            <a:lvl5pPr marL="1828800" indent="0" algn="ctr">
+            <a:lvl5pPr marL="1828754" indent="0" algn="ctr">
               <a:buNone/>
               <a:defRPr>
                 <a:solidFill>
@@ -5540,7 +5560,7 @@
                 </a:solidFill>
               </a:defRPr>
             </a:lvl5pPr>
-            <a:lvl6pPr marL="2286000" indent="0" algn="ctr">
+            <a:lvl6pPr marL="2285943" indent="0" algn="ctr">
               <a:buNone/>
               <a:defRPr>
                 <a:solidFill>
@@ -5550,7 +5570,7 @@
                 </a:solidFill>
               </a:defRPr>
             </a:lvl6pPr>
-            <a:lvl7pPr marL="2743200" indent="0" algn="ctr">
+            <a:lvl7pPr marL="2743131" indent="0" algn="ctr">
               <a:buNone/>
               <a:defRPr>
                 <a:solidFill>
@@ -5560,7 +5580,7 @@
                 </a:solidFill>
               </a:defRPr>
             </a:lvl7pPr>
-            <a:lvl8pPr marL="3200400" indent="0" algn="ctr">
+            <a:lvl8pPr marL="3200320" indent="0" algn="ctr">
               <a:buNone/>
               <a:defRPr>
                 <a:solidFill>
@@ -5570,7 +5590,7 @@
                 </a:solidFill>
               </a:defRPr>
             </a:lvl8pPr>
-            <a:lvl9pPr marL="3657600" indent="0" algn="ctr">
+            <a:lvl9pPr marL="3657509" indent="0" algn="ctr">
               <a:buNone/>
               <a:defRPr>
                 <a:solidFill>
@@ -5611,7 +5631,7 @@
         </p:blipFill>
         <p:spPr>
           <a:xfrm>
-            <a:off x="9758363" y="-14698"/>
+            <a:off x="9758364" y="-14698"/>
             <a:ext cx="2433637" cy="6898640"/>
           </a:xfrm>
           <a:prstGeom prst="rect">
@@ -5712,7 +5732,7 @@
         </p:nvSpPr>
         <p:spPr>
           <a:xfrm>
-            <a:off x="609600" y="457201"/>
+            <a:off x="609600" y="457203"/>
             <a:ext cx="8607272" cy="5953125"/>
           </a:xfrm>
         </p:spPr>
@@ -5721,7 +5741,7 @@
             <a:normAutofit/>
           </a:bodyPr>
           <a:lstStyle>
-            <a:lvl1pPr marL="571500" indent="-571500">
+            <a:lvl1pPr marL="571486" indent="-571486">
               <a:lnSpc>
                 <a:spcPct val="100000"/>
               </a:lnSpc>
@@ -5740,25 +5760,25 @@
                 <a:latin typeface="+mj-lt"/>
               </a:defRPr>
             </a:lvl1pPr>
-            <a:lvl2pPr marL="457200" indent="0">
+            <a:lvl2pPr marL="457189" indent="0">
               <a:buNone/>
               <a:defRPr>
                 <a:latin typeface="+mj-lt"/>
               </a:defRPr>
             </a:lvl2pPr>
-            <a:lvl3pPr marL="914400" indent="0">
+            <a:lvl3pPr marL="914377" indent="0">
               <a:buNone/>
               <a:defRPr>
                 <a:latin typeface="+mj-lt"/>
               </a:defRPr>
             </a:lvl3pPr>
-            <a:lvl4pPr marL="1371600" indent="0">
+            <a:lvl4pPr marL="1371566" indent="0">
               <a:buNone/>
               <a:defRPr>
                 <a:latin typeface="+mj-lt"/>
               </a:defRPr>
             </a:lvl4pPr>
-            <a:lvl5pPr marL="1828800" indent="0">
+            <a:lvl5pPr marL="1828754" indent="0">
               <a:buNone/>
               <a:defRPr>
                 <a:latin typeface="+mj-lt"/>
@@ -5795,7 +5815,7 @@
         </p:blipFill>
         <p:spPr>
           <a:xfrm>
-            <a:off x="9758363" y="-14698"/>
+            <a:off x="9758364" y="-14698"/>
             <a:ext cx="2433637" cy="6898640"/>
           </a:xfrm>
           <a:prstGeom prst="rect">
@@ -5849,7 +5869,7 @@
         </p:nvSpPr>
         <p:spPr>
           <a:xfrm>
-            <a:off x="609600" y="1472183"/>
+            <a:off x="609600" y="1472185"/>
             <a:ext cx="10972800" cy="4709541"/>
           </a:xfrm>
         </p:spPr>
@@ -5941,7 +5961,7 @@
         </p:nvSpPr>
         <p:spPr>
           <a:xfrm>
-            <a:off x="609599" y="6446570"/>
+            <a:off x="609601" y="6446572"/>
             <a:ext cx="9663113" cy="222323"/>
           </a:xfrm>
           <a:prstGeom prst="rect">
@@ -5952,7 +5972,7 @@
           <a:bodyPr vert="horz" lIns="91440" tIns="45720" rIns="91440" bIns="45720" rtlCol="0" anchor="t"/>
           <a:lstStyle>
             <a:lvl1pPr algn="l">
-              <a:defRPr sz="1100" kern="700" cap="small" spc="50" baseline="0">
+              <a:defRPr sz="1100" kern="700" cap="small" spc="51" baseline="0">
                 <a:solidFill>
                   <a:schemeClr val="tx1">
                     <a:lumMod val="50000"/>
@@ -5979,7 +5999,7 @@
         </p:nvSpPr>
         <p:spPr>
           <a:xfrm>
-            <a:off x="10446059" y="6446570"/>
+            <a:off x="10446060" y="6446572"/>
             <a:ext cx="1136341" cy="222323"/>
           </a:xfrm>
           <a:prstGeom prst="rect">
@@ -6088,7 +6108,7 @@
         </p:nvSpPr>
         <p:spPr>
           <a:xfrm>
-            <a:off x="609600" y="1472185"/>
+            <a:off x="609600" y="1472186"/>
             <a:ext cx="10972800" cy="4129963"/>
           </a:xfrm>
         </p:spPr>
@@ -6198,7 +6218,7 @@
         </p:nvSpPr>
         <p:spPr>
           <a:xfrm>
-            <a:off x="609599" y="6446570"/>
+            <a:off x="609601" y="6446572"/>
             <a:ext cx="9663113" cy="222323"/>
           </a:xfrm>
           <a:prstGeom prst="rect">
@@ -6209,7 +6229,7 @@
           <a:bodyPr vert="horz" lIns="91440" tIns="45720" rIns="91440" bIns="45720" rtlCol="0" anchor="t"/>
           <a:lstStyle>
             <a:lvl1pPr algn="l">
-              <a:defRPr sz="1100" kern="700" cap="small" spc="50" baseline="0">
+              <a:defRPr sz="1100" kern="700" cap="small" spc="51" baseline="0">
                 <a:solidFill>
                   <a:schemeClr val="tx1">
                     <a:lumMod val="50000"/>
@@ -6236,7 +6256,7 @@
         </p:nvSpPr>
         <p:spPr>
           <a:xfrm>
-            <a:off x="10446059" y="6446570"/>
+            <a:off x="10446060" y="6446572"/>
             <a:ext cx="1136341" cy="222323"/>
           </a:xfrm>
           <a:prstGeom prst="rect">
@@ -6278,7 +6298,7 @@
         </p:nvSpPr>
         <p:spPr>
           <a:xfrm>
-            <a:off x="609600" y="5602148"/>
+            <a:off x="609600" y="5602150"/>
             <a:ext cx="10972800" cy="590691"/>
           </a:xfrm>
         </p:spPr>
@@ -6295,19 +6315,19 @@
                 </a:solidFill>
               </a:defRPr>
             </a:lvl1pPr>
-            <a:lvl2pPr marL="457200" indent="0">
+            <a:lvl2pPr marL="457189" indent="0">
               <a:buNone/>
               <a:defRPr sz="1400"/>
             </a:lvl2pPr>
-            <a:lvl3pPr marL="914400" indent="0">
+            <a:lvl3pPr marL="914377" indent="0">
               <a:buNone/>
               <a:defRPr sz="1400"/>
             </a:lvl3pPr>
-            <a:lvl4pPr marL="1371600" indent="0">
+            <a:lvl4pPr marL="1371566" indent="0">
               <a:buNone/>
               <a:defRPr sz="1400"/>
             </a:lvl4pPr>
-            <a:lvl5pPr marL="1828800" indent="0">
+            <a:lvl5pPr marL="1828754" indent="0">
               <a:buNone/>
               <a:defRPr sz="1400"/>
             </a:lvl5pPr>
@@ -6363,7 +6383,7 @@
         </p:nvSpPr>
         <p:spPr>
           <a:xfrm>
-            <a:off x="609599" y="195072"/>
+            <a:off x="609599" y="195074"/>
             <a:ext cx="10972800" cy="1158239"/>
           </a:xfrm>
         </p:spPr>
@@ -6509,7 +6529,7 @@
         </p:nvSpPr>
         <p:spPr>
           <a:xfrm>
-            <a:off x="609601" y="1471614"/>
+            <a:off x="609602" y="1471616"/>
             <a:ext cx="10972799" cy="631825"/>
           </a:xfrm>
         </p:spPr>
@@ -6526,19 +6546,19 @@
                 </a:solidFill>
               </a:defRPr>
             </a:lvl1pPr>
-            <a:lvl2pPr marL="457200" indent="0">
+            <a:lvl2pPr marL="457189" indent="0">
               <a:buNone/>
               <a:defRPr/>
             </a:lvl2pPr>
-            <a:lvl3pPr marL="914400" indent="0">
+            <a:lvl3pPr marL="914377" indent="0">
               <a:buNone/>
               <a:defRPr/>
             </a:lvl3pPr>
-            <a:lvl4pPr marL="1371600" indent="0">
+            <a:lvl4pPr marL="1371566" indent="0">
               <a:buNone/>
               <a:defRPr/>
             </a:lvl4pPr>
-            <a:lvl5pPr marL="1828800" indent="0">
+            <a:lvl5pPr marL="1828754" indent="0">
               <a:buNone/>
               <a:defRPr/>
             </a:lvl5pPr>
@@ -6564,7 +6584,7 @@
         </p:nvSpPr>
         <p:spPr>
           <a:xfrm>
-            <a:off x="609599" y="6446570"/>
+            <a:off x="609601" y="6446572"/>
             <a:ext cx="9663113" cy="222323"/>
           </a:xfrm>
           <a:prstGeom prst="rect">
@@ -6575,7 +6595,7 @@
           <a:bodyPr vert="horz" lIns="91440" tIns="45720" rIns="91440" bIns="45720" rtlCol="0" anchor="t"/>
           <a:lstStyle>
             <a:lvl1pPr algn="l">
-              <a:defRPr sz="1100" kern="700" cap="small" spc="50" baseline="0">
+              <a:defRPr sz="1100" kern="700" cap="small" spc="51" baseline="0">
                 <a:solidFill>
                   <a:schemeClr val="tx1">
                     <a:lumMod val="50000"/>
@@ -6602,7 +6622,7 @@
         </p:nvSpPr>
         <p:spPr>
           <a:xfrm>
-            <a:off x="10446059" y="6446570"/>
+            <a:off x="10446060" y="6446572"/>
             <a:ext cx="1136341" cy="222323"/>
           </a:xfrm>
           <a:prstGeom prst="rect">
@@ -6644,7 +6664,7 @@
         </p:nvSpPr>
         <p:spPr>
           <a:xfrm>
-            <a:off x="609600" y="5602148"/>
+            <a:off x="609600" y="5602150"/>
             <a:ext cx="10972800" cy="590691"/>
           </a:xfrm>
         </p:spPr>
@@ -6661,19 +6681,19 @@
                 </a:solidFill>
               </a:defRPr>
             </a:lvl1pPr>
-            <a:lvl2pPr marL="457200" indent="0">
+            <a:lvl2pPr marL="457189" indent="0">
               <a:buNone/>
               <a:defRPr sz="1400"/>
             </a:lvl2pPr>
-            <a:lvl3pPr marL="914400" indent="0">
+            <a:lvl3pPr marL="914377" indent="0">
               <a:buNone/>
               <a:defRPr sz="1400"/>
             </a:lvl3pPr>
-            <a:lvl4pPr marL="1371600" indent="0">
+            <a:lvl4pPr marL="1371566" indent="0">
               <a:buNone/>
               <a:defRPr sz="1400"/>
             </a:lvl4pPr>
-            <a:lvl5pPr marL="1828800" indent="0">
+            <a:lvl5pPr marL="1828754" indent="0">
               <a:buNone/>
               <a:defRPr sz="1400"/>
             </a:lvl5pPr>
@@ -6729,7 +6749,7 @@
         </p:nvSpPr>
         <p:spPr>
           <a:xfrm>
-            <a:off x="609600" y="195072"/>
+            <a:off x="609600" y="195074"/>
             <a:ext cx="10972800" cy="1158241"/>
           </a:xfrm>
         </p:spPr>
@@ -6890,7 +6910,7 @@
         </p:nvSpPr>
         <p:spPr>
           <a:xfrm>
-            <a:off x="609599" y="6446570"/>
+            <a:off x="609601" y="6446572"/>
             <a:ext cx="9663113" cy="222323"/>
           </a:xfrm>
           <a:prstGeom prst="rect">
@@ -6901,7 +6921,7 @@
           <a:bodyPr vert="horz" lIns="91440" tIns="45720" rIns="91440" bIns="45720" rtlCol="0" anchor="t"/>
           <a:lstStyle>
             <a:lvl1pPr algn="l">
-              <a:defRPr sz="1100" kern="700" cap="small" spc="50" baseline="0">
+              <a:defRPr sz="1100" kern="700" cap="small" spc="51" baseline="0">
                 <a:solidFill>
                   <a:schemeClr val="tx1">
                     <a:lumMod val="50000"/>
@@ -6928,7 +6948,7 @@
         </p:nvSpPr>
         <p:spPr>
           <a:xfrm>
-            <a:off x="10446059" y="6446570"/>
+            <a:off x="10446060" y="6446572"/>
             <a:ext cx="1136341" cy="222323"/>
           </a:xfrm>
           <a:prstGeom prst="rect">
@@ -7099,7 +7119,7 @@
         </p:nvSpPr>
         <p:spPr>
           <a:xfrm>
-            <a:off x="609599" y="6446570"/>
+            <a:off x="609601" y="6446572"/>
             <a:ext cx="9663113" cy="222323"/>
           </a:xfrm>
           <a:prstGeom prst="rect">
@@ -7110,7 +7130,7 @@
           <a:bodyPr vert="horz" lIns="91440" tIns="45720" rIns="91440" bIns="45720" rtlCol="0" anchor="t"/>
           <a:lstStyle>
             <a:lvl1pPr algn="l">
-              <a:defRPr sz="1100" kern="700" cap="small" spc="50" baseline="0">
+              <a:defRPr sz="1100" kern="700" cap="small" spc="51" baseline="0">
                 <a:solidFill>
                   <a:schemeClr val="tx1">
                     <a:lumMod val="50000"/>
@@ -7137,7 +7157,7 @@
         </p:nvSpPr>
         <p:spPr>
           <a:xfrm>
-            <a:off x="10446059" y="6446570"/>
+            <a:off x="10446060" y="6446572"/>
             <a:ext cx="1136341" cy="222323"/>
           </a:xfrm>
           <a:prstGeom prst="rect">
@@ -7199,7 +7219,7 @@
   </p:sldLayoutIdLst>
   <p:txStyles>
     <p:titleStyle>
-      <a:lvl1pPr algn="l" defTabSz="609585" rtl="0" eaLnBrk="1" latinLnBrk="0" hangingPunct="1">
+      <a:lvl1pPr algn="l" defTabSz="609570" rtl="0" eaLnBrk="1" latinLnBrk="0" hangingPunct="1">
         <a:spcBef>
           <a:spcPct val="0"/>
         </a:spcBef>
@@ -7215,7 +7235,7 @@
       </a:lvl1pPr>
     </p:titleStyle>
     <p:bodyStyle>
-      <a:lvl1pPr marL="457189" indent="-457189" algn="l" defTabSz="609585" rtl="0" eaLnBrk="1" latinLnBrk="0" hangingPunct="1">
+      <a:lvl1pPr marL="457178" indent="-457178" algn="l" defTabSz="609570" rtl="0" eaLnBrk="1" latinLnBrk="0" hangingPunct="1">
         <a:spcBef>
           <a:spcPct val="20000"/>
         </a:spcBef>
@@ -7233,7 +7253,7 @@
           <a:cs typeface="+mn-cs"/>
         </a:defRPr>
       </a:lvl1pPr>
-      <a:lvl2pPr marL="990575" indent="-380990" algn="l" defTabSz="609585" rtl="0" eaLnBrk="1" latinLnBrk="0" hangingPunct="1">
+      <a:lvl2pPr marL="990550" indent="-380981" algn="l" defTabSz="609570" rtl="0" eaLnBrk="1" latinLnBrk="0" hangingPunct="1">
         <a:spcBef>
           <a:spcPct val="20000"/>
         </a:spcBef>
@@ -7251,7 +7271,7 @@
           <a:cs typeface="+mn-cs"/>
         </a:defRPr>
       </a:lvl2pPr>
-      <a:lvl3pPr marL="1523962" indent="-304792" algn="l" defTabSz="609585" rtl="0" eaLnBrk="1" latinLnBrk="0" hangingPunct="1">
+      <a:lvl3pPr marL="1523925" indent="-304784" algn="l" defTabSz="609570" rtl="0" eaLnBrk="1" latinLnBrk="0" hangingPunct="1">
         <a:spcBef>
           <a:spcPct val="20000"/>
         </a:spcBef>
@@ -7269,7 +7289,7 @@
           <a:cs typeface="+mn-cs"/>
         </a:defRPr>
       </a:lvl3pPr>
-      <a:lvl4pPr marL="2133547" indent="-304792" algn="l" defTabSz="609585" rtl="0" eaLnBrk="1" latinLnBrk="0" hangingPunct="1">
+      <a:lvl4pPr marL="2133493" indent="-304784" algn="l" defTabSz="609570" rtl="0" eaLnBrk="1" latinLnBrk="0" hangingPunct="1">
         <a:spcBef>
           <a:spcPct val="20000"/>
         </a:spcBef>
@@ -7287,7 +7307,7 @@
           <a:cs typeface="+mn-cs"/>
         </a:defRPr>
       </a:lvl4pPr>
-      <a:lvl5pPr marL="2743131" indent="-304792" algn="l" defTabSz="609585" rtl="0" eaLnBrk="1" latinLnBrk="0" hangingPunct="1">
+      <a:lvl5pPr marL="2743062" indent="-304784" algn="l" defTabSz="609570" rtl="0" eaLnBrk="1" latinLnBrk="0" hangingPunct="1">
         <a:spcBef>
           <a:spcPct val="20000"/>
         </a:spcBef>
@@ -7305,7 +7325,7 @@
           <a:cs typeface="+mn-cs"/>
         </a:defRPr>
       </a:lvl5pPr>
-      <a:lvl6pPr marL="3352716" indent="-304792" algn="l" defTabSz="609585" rtl="0" eaLnBrk="1" latinLnBrk="0" hangingPunct="1">
+      <a:lvl6pPr marL="3352632" indent="-304784" algn="l" defTabSz="609570" rtl="0" eaLnBrk="1" latinLnBrk="0" hangingPunct="1">
         <a:spcBef>
           <a:spcPct val="20000"/>
         </a:spcBef>
@@ -7320,7 +7340,7 @@
           <a:cs typeface="+mn-cs"/>
         </a:defRPr>
       </a:lvl6pPr>
-      <a:lvl7pPr marL="3962301" indent="-304792" algn="l" defTabSz="609585" rtl="0" eaLnBrk="1" latinLnBrk="0" hangingPunct="1">
+      <a:lvl7pPr marL="3962202" indent="-304784" algn="l" defTabSz="609570" rtl="0" eaLnBrk="1" latinLnBrk="0" hangingPunct="1">
         <a:spcBef>
           <a:spcPct val="20000"/>
         </a:spcBef>
@@ -7335,7 +7355,7 @@
           <a:cs typeface="+mn-cs"/>
         </a:defRPr>
       </a:lvl7pPr>
-      <a:lvl8pPr marL="4571886" indent="-304792" algn="l" defTabSz="609585" rtl="0" eaLnBrk="1" latinLnBrk="0" hangingPunct="1">
+      <a:lvl8pPr marL="4571772" indent="-304784" algn="l" defTabSz="609570" rtl="0" eaLnBrk="1" latinLnBrk="0" hangingPunct="1">
         <a:spcBef>
           <a:spcPct val="20000"/>
         </a:spcBef>
@@ -7350,7 +7370,7 @@
           <a:cs typeface="+mn-cs"/>
         </a:defRPr>
       </a:lvl8pPr>
-      <a:lvl9pPr marL="5181470" indent="-304792" algn="l" defTabSz="609585" rtl="0" eaLnBrk="1" latinLnBrk="0" hangingPunct="1">
+      <a:lvl9pPr marL="5181341" indent="-304784" algn="l" defTabSz="609570" rtl="0" eaLnBrk="1" latinLnBrk="0" hangingPunct="1">
         <a:spcBef>
           <a:spcPct val="20000"/>
         </a:spcBef>
@@ -7370,7 +7390,7 @@
       <a:defPPr>
         <a:defRPr lang="en-US"/>
       </a:defPPr>
-      <a:lvl1pPr marL="0" algn="l" defTabSz="609585" rtl="0" eaLnBrk="1" latinLnBrk="0" hangingPunct="1">
+      <a:lvl1pPr marL="0" algn="l" defTabSz="609570" rtl="0" eaLnBrk="1" latinLnBrk="0" hangingPunct="1">
         <a:defRPr sz="2400" kern="1200">
           <a:solidFill>
             <a:schemeClr val="tx1"/>
@@ -7380,7 +7400,7 @@
           <a:cs typeface="+mn-cs"/>
         </a:defRPr>
       </a:lvl1pPr>
-      <a:lvl2pPr marL="609585" algn="l" defTabSz="609585" rtl="0" eaLnBrk="1" latinLnBrk="0" hangingPunct="1">
+      <a:lvl2pPr marL="609570" algn="l" defTabSz="609570" rtl="0" eaLnBrk="1" latinLnBrk="0" hangingPunct="1">
         <a:defRPr sz="2400" kern="1200">
           <a:solidFill>
             <a:schemeClr val="tx1"/>
@@ -7390,7 +7410,7 @@
           <a:cs typeface="+mn-cs"/>
         </a:defRPr>
       </a:lvl2pPr>
-      <a:lvl3pPr marL="1219170" algn="l" defTabSz="609585" rtl="0" eaLnBrk="1" latinLnBrk="0" hangingPunct="1">
+      <a:lvl3pPr marL="1219140" algn="l" defTabSz="609570" rtl="0" eaLnBrk="1" latinLnBrk="0" hangingPunct="1">
         <a:defRPr sz="2400" kern="1200">
           <a:solidFill>
             <a:schemeClr val="tx1"/>
@@ -7400,7 +7420,7 @@
           <a:cs typeface="+mn-cs"/>
         </a:defRPr>
       </a:lvl3pPr>
-      <a:lvl4pPr marL="1828754" algn="l" defTabSz="609585" rtl="0" eaLnBrk="1" latinLnBrk="0" hangingPunct="1">
+      <a:lvl4pPr marL="1828709" algn="l" defTabSz="609570" rtl="0" eaLnBrk="1" latinLnBrk="0" hangingPunct="1">
         <a:defRPr sz="2400" kern="1200">
           <a:solidFill>
             <a:schemeClr val="tx1"/>
@@ -7410,7 +7430,7 @@
           <a:cs typeface="+mn-cs"/>
         </a:defRPr>
       </a:lvl4pPr>
-      <a:lvl5pPr marL="2438339" algn="l" defTabSz="609585" rtl="0" eaLnBrk="1" latinLnBrk="0" hangingPunct="1">
+      <a:lvl5pPr marL="2438278" algn="l" defTabSz="609570" rtl="0" eaLnBrk="1" latinLnBrk="0" hangingPunct="1">
         <a:defRPr sz="2400" kern="1200">
           <a:solidFill>
             <a:schemeClr val="tx1"/>
@@ -7420,7 +7440,7 @@
           <a:cs typeface="+mn-cs"/>
         </a:defRPr>
       </a:lvl5pPr>
-      <a:lvl6pPr marL="3047924" algn="l" defTabSz="609585" rtl="0" eaLnBrk="1" latinLnBrk="0" hangingPunct="1">
+      <a:lvl6pPr marL="3047848" algn="l" defTabSz="609570" rtl="0" eaLnBrk="1" latinLnBrk="0" hangingPunct="1">
         <a:defRPr sz="2400" kern="1200">
           <a:solidFill>
             <a:schemeClr val="tx1"/>
@@ -7430,7 +7450,7 @@
           <a:cs typeface="+mn-cs"/>
         </a:defRPr>
       </a:lvl6pPr>
-      <a:lvl7pPr marL="3657509" algn="l" defTabSz="609585" rtl="0" eaLnBrk="1" latinLnBrk="0" hangingPunct="1">
+      <a:lvl7pPr marL="3657418" algn="l" defTabSz="609570" rtl="0" eaLnBrk="1" latinLnBrk="0" hangingPunct="1">
         <a:defRPr sz="2400" kern="1200">
           <a:solidFill>
             <a:schemeClr val="tx1"/>
@@ -7440,7 +7460,7 @@
           <a:cs typeface="+mn-cs"/>
         </a:defRPr>
       </a:lvl7pPr>
-      <a:lvl8pPr marL="4267093" algn="l" defTabSz="609585" rtl="0" eaLnBrk="1" latinLnBrk="0" hangingPunct="1">
+      <a:lvl8pPr marL="4266987" algn="l" defTabSz="609570" rtl="0" eaLnBrk="1" latinLnBrk="0" hangingPunct="1">
         <a:defRPr sz="2400" kern="1200">
           <a:solidFill>
             <a:schemeClr val="tx1"/>
@@ -7450,7 +7470,7 @@
           <a:cs typeface="+mn-cs"/>
         </a:defRPr>
       </a:lvl8pPr>
-      <a:lvl9pPr marL="4876678" algn="l" defTabSz="609585" rtl="0" eaLnBrk="1" latinLnBrk="0" hangingPunct="1">
+      <a:lvl9pPr marL="4876557" algn="l" defTabSz="609570" rtl="0" eaLnBrk="1" latinLnBrk="0" hangingPunct="1">
         <a:defRPr sz="2400" kern="1200">
           <a:solidFill>
             <a:schemeClr val="tx1"/>
@@ -7569,7 +7589,7 @@
         </p:nvCxnSpPr>
         <p:spPr>
           <a:xfrm>
-            <a:off x="1698171" y="5257800"/>
+            <a:off x="1698173" y="5257800"/>
             <a:ext cx="4435929" cy="0"/>
           </a:xfrm>
           <a:prstGeom prst="straightConnector1">
@@ -7612,8 +7632,8 @@
         </p:nvSpPr>
         <p:spPr>
           <a:xfrm>
-            <a:off x="2351314" y="5878286"/>
-            <a:ext cx="2922815" cy="369296"/>
+            <a:off x="2351315" y="5878286"/>
+            <a:ext cx="2922815" cy="369332"/>
           </a:xfrm>
           <a:prstGeom prst="rect">
             <a:avLst/>
@@ -7687,7 +7707,7 @@
         </p:nvSpPr>
         <p:spPr>
           <a:xfrm>
-            <a:off x="10300926" y="6538611"/>
+            <a:off x="10300927" y="6538611"/>
             <a:ext cx="146957" cy="146304"/>
           </a:xfrm>
           <a:prstGeom prst="ellipse">
@@ -7739,7 +7759,7 @@
         <p:spPr>
           <a:xfrm>
             <a:off x="10447883" y="6382905"/>
-            <a:ext cx="1594298" cy="307777"/>
+            <a:ext cx="1594299" cy="307777"/>
           </a:xfrm>
           <a:prstGeom prst="rect">
             <a:avLst/>
@@ -7774,7 +7794,7 @@
         <p:spPr>
           <a:xfrm>
             <a:off x="6008898" y="4912104"/>
-            <a:ext cx="696702" cy="307777"/>
+            <a:ext cx="696703" cy="307777"/>
           </a:xfrm>
           <a:prstGeom prst="rect">
             <a:avLst/>
@@ -7817,7 +7837,7 @@
         </p:nvSpPr>
         <p:spPr>
           <a:xfrm>
-            <a:off x="5920234" y="4951856"/>
+            <a:off x="5920235" y="4951856"/>
             <a:ext cx="146957" cy="146304"/>
           </a:xfrm>
           <a:prstGeom prst="ellipse">
@@ -7873,7 +7893,7 @@
         </p:nvSpPr>
         <p:spPr>
           <a:xfrm>
-            <a:off x="5803693" y="4871179"/>
+            <a:off x="5803694" y="4871179"/>
             <a:ext cx="146957" cy="146304"/>
           </a:xfrm>
           <a:prstGeom prst="ellipse">
@@ -7924,7 +7944,7 @@
         </p:nvSpPr>
         <p:spPr>
           <a:xfrm>
-            <a:off x="5803693" y="4624203"/>
+            <a:off x="5803693" y="4624204"/>
             <a:ext cx="1475016" cy="307777"/>
           </a:xfrm>
           <a:prstGeom prst="rect">
@@ -7968,7 +7988,7 @@
         </p:nvSpPr>
         <p:spPr>
           <a:xfrm>
-            <a:off x="1836055" y="1623711"/>
+            <a:off x="1836056" y="1623711"/>
             <a:ext cx="146957" cy="146304"/>
           </a:xfrm>
           <a:prstGeom prst="ellipse">
@@ -8019,7 +8039,7 @@
         </p:nvSpPr>
         <p:spPr>
           <a:xfrm>
-            <a:off x="1932211" y="1429905"/>
+            <a:off x="1932213" y="1429905"/>
             <a:ext cx="556983" cy="307777"/>
           </a:xfrm>
           <a:prstGeom prst="rect">
@@ -8058,8 +8078,8 @@
         </p:nvSpPr>
         <p:spPr>
           <a:xfrm>
-            <a:off x="1908309" y="5009503"/>
-            <a:ext cx="696702" cy="307777"/>
+            <a:off x="1908310" y="5009503"/>
+            <a:ext cx="696703" cy="307777"/>
           </a:xfrm>
           <a:prstGeom prst="rect">
             <a:avLst/>
@@ -8102,7 +8122,7 @@
         </p:nvSpPr>
         <p:spPr>
           <a:xfrm>
-            <a:off x="1866693" y="4943225"/>
+            <a:off x="1866694" y="4943225"/>
             <a:ext cx="146957" cy="146304"/>
           </a:xfrm>
           <a:prstGeom prst="ellipse">
@@ -8197,7 +8217,7 @@
         </p:nvSpPr>
         <p:spPr>
           <a:xfrm>
-            <a:off x="1810655" y="5065411"/>
+            <a:off x="1810656" y="5065411"/>
             <a:ext cx="146957" cy="146304"/>
           </a:xfrm>
           <a:prstGeom prst="ellipse">
@@ -8249,7 +8269,7 @@
         <p:spPr>
           <a:xfrm>
             <a:off x="3665923" y="3192973"/>
-            <a:ext cx="696702" cy="307777"/>
+            <a:ext cx="696703" cy="307777"/>
           </a:xfrm>
           <a:prstGeom prst="rect">
             <a:avLst/>
@@ -8292,7 +8312,7 @@
         </p:nvSpPr>
         <p:spPr>
           <a:xfrm>
-            <a:off x="3577259" y="3232725"/>
+            <a:off x="3577260" y="3232725"/>
             <a:ext cx="146957" cy="146304"/>
           </a:xfrm>
           <a:prstGeom prst="ellipse">
@@ -8348,7 +8368,7 @@
         </p:nvSpPr>
         <p:spPr>
           <a:xfrm>
-            <a:off x="4443486" y="3639156"/>
+            <a:off x="4443487" y="3639156"/>
             <a:ext cx="146957" cy="146304"/>
           </a:xfrm>
           <a:prstGeom prst="ellipse">
@@ -8399,7 +8419,7 @@
         </p:nvSpPr>
         <p:spPr>
           <a:xfrm>
-            <a:off x="4443486" y="3392180"/>
+            <a:off x="4443487" y="3392181"/>
             <a:ext cx="1475016" cy="307777"/>
           </a:xfrm>
           <a:prstGeom prst="rect">
@@ -8443,7 +8463,7 @@
         </p:nvSpPr>
         <p:spPr>
           <a:xfrm>
-            <a:off x="3016337" y="5040671"/>
+            <a:off x="3016338" y="5040671"/>
             <a:ext cx="146957" cy="146304"/>
           </a:xfrm>
           <a:prstGeom prst="ellipse">
@@ -8494,7 +8514,7 @@
         </p:nvSpPr>
         <p:spPr>
           <a:xfrm>
-            <a:off x="3016337" y="4793695"/>
+            <a:off x="3016337" y="4793696"/>
             <a:ext cx="1475016" cy="307777"/>
           </a:xfrm>
           <a:prstGeom prst="rect">
@@ -8538,7 +8558,7 @@
         </p:nvSpPr>
         <p:spPr>
           <a:xfrm>
-            <a:off x="3049094" y="4321396"/>
+            <a:off x="3049095" y="4321396"/>
             <a:ext cx="146957" cy="146304"/>
           </a:xfrm>
           <a:prstGeom prst="ellipse">
@@ -8589,7 +8609,7 @@
         </p:nvSpPr>
         <p:spPr>
           <a:xfrm>
-            <a:off x="3049094" y="4074420"/>
+            <a:off x="3049095" y="4074421"/>
             <a:ext cx="1475016" cy="307777"/>
           </a:xfrm>
           <a:prstGeom prst="rect">
@@ -8628,7 +8648,7 @@
         </p:nvSpPr>
         <p:spPr>
           <a:xfrm>
-            <a:off x="3784138" y="4892163"/>
+            <a:off x="3784139" y="4892163"/>
             <a:ext cx="986451" cy="307777"/>
           </a:xfrm>
           <a:prstGeom prst="rect">
@@ -8672,7 +8692,7 @@
         </p:nvSpPr>
         <p:spPr>
           <a:xfrm>
-            <a:off x="3729659" y="5060102"/>
+            <a:off x="3729660" y="5060103"/>
             <a:ext cx="146957" cy="146304"/>
           </a:xfrm>
           <a:prstGeom prst="ellipse">
@@ -8729,8 +8749,8 @@
         </p:nvCxnSpPr>
         <p:spPr>
           <a:xfrm>
-            <a:off x="1908309" y="5330745"/>
-            <a:ext cx="5546376" cy="343758"/>
+            <a:off x="1908309" y="5330746"/>
+            <a:ext cx="5546376" cy="343759"/>
           </a:xfrm>
           <a:prstGeom prst="bentConnector3">
             <a:avLst>
@@ -8777,7 +8797,7 @@
         </p:nvCxnSpPr>
         <p:spPr>
           <a:xfrm flipV="1">
-            <a:off x="6067191" y="4228308"/>
+            <a:off x="6067193" y="4228308"/>
             <a:ext cx="1380039" cy="714920"/>
           </a:xfrm>
           <a:prstGeom prst="bentConnector3">
@@ -8825,7 +8845,7 @@
         </p:nvCxnSpPr>
         <p:spPr>
           <a:xfrm flipV="1">
-            <a:off x="3631081" y="2564350"/>
+            <a:off x="3631082" y="2564351"/>
             <a:ext cx="3823604" cy="631903"/>
           </a:xfrm>
           <a:prstGeom prst="bentConnector3">
@@ -8873,8 +8893,8 @@
         </p:nvCxnSpPr>
         <p:spPr>
           <a:xfrm>
-            <a:off x="2351314" y="1600199"/>
-            <a:ext cx="5103371" cy="7354"/>
+            <a:off x="2351315" y="1600199"/>
+            <a:ext cx="5103371" cy="7355"/>
           </a:xfrm>
           <a:prstGeom prst="line">
             <a:avLst/>
@@ -8916,8 +8936,8 @@
         </p:nvSpPr>
         <p:spPr>
           <a:xfrm>
-            <a:off x="7454685" y="1229328"/>
-            <a:ext cx="4401518" cy="954107"/>
+            <a:off x="7454686" y="1229329"/>
+            <a:ext cx="4401519" cy="954107"/>
           </a:xfrm>
           <a:prstGeom prst="rect">
             <a:avLst/>
@@ -8952,7 +8972,7 @@
         <p:spPr>
           <a:xfrm>
             <a:off x="7447230" y="2337427"/>
-            <a:ext cx="4293030" cy="738664"/>
+            <a:ext cx="4293031" cy="738664"/>
           </a:xfrm>
           <a:prstGeom prst="rect">
             <a:avLst/>
@@ -8987,7 +9007,7 @@
         <p:spPr>
           <a:xfrm>
             <a:off x="7447230" y="3959966"/>
-            <a:ext cx="4293030" cy="523220"/>
+            <a:ext cx="4293031" cy="523220"/>
           </a:xfrm>
           <a:prstGeom prst="rect">
             <a:avLst/>
@@ -9022,7 +9042,7 @@
         <p:spPr>
           <a:xfrm>
             <a:off x="7447230" y="5140251"/>
-            <a:ext cx="4293030" cy="738664"/>
+            <a:ext cx="4293031" cy="738664"/>
           </a:xfrm>
           <a:prstGeom prst="rect">
             <a:avLst/>
@@ -9165,7 +9185,7 @@
         </p:nvCxnSpPr>
         <p:spPr>
           <a:xfrm>
-            <a:off x="3634548" y="3731085"/>
+            <a:off x="3634549" y="3731085"/>
             <a:ext cx="4435929" cy="0"/>
           </a:xfrm>
           <a:prstGeom prst="straightConnector1">
@@ -9209,8 +9229,8 @@
         </p:nvSpPr>
         <p:spPr>
           <a:xfrm>
-            <a:off x="7495254" y="4466898"/>
-            <a:ext cx="696702" cy="307777"/>
+            <a:off x="7495254" y="4466899"/>
+            <a:ext cx="696703" cy="307777"/>
           </a:xfrm>
           <a:prstGeom prst="rect">
             <a:avLst/>
@@ -9253,7 +9273,7 @@
         </p:nvSpPr>
         <p:spPr>
           <a:xfrm>
-            <a:off x="7822745" y="4759145"/>
+            <a:off x="7822746" y="4759145"/>
             <a:ext cx="146957" cy="146304"/>
           </a:xfrm>
           <a:prstGeom prst="ellipse">
@@ -9309,7 +9329,7 @@
         </p:nvSpPr>
         <p:spPr>
           <a:xfrm>
-            <a:off x="7536045" y="4871112"/>
+            <a:off x="7536046" y="4871112"/>
             <a:ext cx="146957" cy="146304"/>
           </a:xfrm>
           <a:prstGeom prst="ellipse">
@@ -9360,8 +9380,8 @@
         </p:nvSpPr>
         <p:spPr>
           <a:xfrm>
-            <a:off x="7140307" y="4877245"/>
-            <a:ext cx="509202" cy="307777"/>
+            <a:off x="7140307" y="4877246"/>
+            <a:ext cx="509203" cy="307777"/>
           </a:xfrm>
           <a:prstGeom prst="rect">
             <a:avLst/>
@@ -9404,8 +9424,8 @@
         </p:nvSpPr>
         <p:spPr>
           <a:xfrm>
-            <a:off x="3941765" y="2047195"/>
-            <a:ext cx="136670" cy="136063"/>
+            <a:off x="3941766" y="2047197"/>
+            <a:ext cx="136671" cy="136063"/>
           </a:xfrm>
           <a:prstGeom prst="ellipse">
             <a:avLst/>
@@ -9455,7 +9475,7 @@
         </p:nvSpPr>
         <p:spPr>
           <a:xfrm>
-            <a:off x="4037920" y="1853386"/>
+            <a:off x="4037922" y="1853387"/>
             <a:ext cx="556983" cy="307777"/>
           </a:xfrm>
           <a:prstGeom prst="rect">
@@ -9494,8 +9514,8 @@
         </p:nvSpPr>
         <p:spPr>
           <a:xfrm>
-            <a:off x="3810820" y="4389951"/>
-            <a:ext cx="696702" cy="307777"/>
+            <a:off x="3810821" y="4389951"/>
+            <a:ext cx="696703" cy="307777"/>
           </a:xfrm>
           <a:prstGeom prst="rect">
             <a:avLst/>
@@ -9538,7 +9558,7 @@
         </p:nvSpPr>
         <p:spPr>
           <a:xfrm>
-            <a:off x="4226400" y="2877526"/>
+            <a:off x="4226400" y="2877527"/>
             <a:ext cx="146957" cy="146304"/>
           </a:xfrm>
           <a:prstGeom prst="ellipse">
@@ -9589,7 +9609,7 @@
         </p:nvSpPr>
         <p:spPr>
           <a:xfrm>
-            <a:off x="4325745" y="2817516"/>
+            <a:off x="4325745" y="2817517"/>
             <a:ext cx="1475016" cy="307777"/>
           </a:xfrm>
           <a:prstGeom prst="rect">
@@ -9633,7 +9653,7 @@
         </p:nvSpPr>
         <p:spPr>
           <a:xfrm>
-            <a:off x="3713166" y="4445859"/>
+            <a:off x="3713167" y="4445859"/>
             <a:ext cx="146957" cy="146304"/>
           </a:xfrm>
           <a:prstGeom prst="ellipse">
@@ -9684,8 +9704,8 @@
         </p:nvSpPr>
         <p:spPr>
           <a:xfrm>
-            <a:off x="5988605" y="2048820"/>
-            <a:ext cx="696702" cy="307777"/>
+            <a:off x="5988606" y="2048820"/>
+            <a:ext cx="696703" cy="307777"/>
           </a:xfrm>
           <a:prstGeom prst="rect">
             <a:avLst/>
@@ -9728,7 +9748,7 @@
         </p:nvSpPr>
         <p:spPr>
           <a:xfrm>
-            <a:off x="6038569" y="2340849"/>
+            <a:off x="6038570" y="2340849"/>
             <a:ext cx="146957" cy="146304"/>
           </a:xfrm>
           <a:prstGeom prst="ellipse">
@@ -9784,7 +9804,7 @@
         </p:nvSpPr>
         <p:spPr>
           <a:xfrm>
-            <a:off x="6767605" y="2772377"/>
+            <a:off x="6767606" y="2772377"/>
             <a:ext cx="146957" cy="146304"/>
           </a:xfrm>
           <a:prstGeom prst="ellipse">
@@ -9835,7 +9855,7 @@
         </p:nvSpPr>
         <p:spPr>
           <a:xfrm>
-            <a:off x="6835337" y="2886165"/>
+            <a:off x="6835338" y="2886165"/>
             <a:ext cx="683677" cy="307777"/>
           </a:xfrm>
           <a:prstGeom prst="rect">
@@ -9879,7 +9899,7 @@
         </p:nvSpPr>
         <p:spPr>
           <a:xfrm>
-            <a:off x="4952714" y="5362556"/>
+            <a:off x="4952715" y="5362556"/>
             <a:ext cx="146957" cy="146304"/>
           </a:xfrm>
           <a:prstGeom prst="ellipse">
@@ -9930,7 +9950,7 @@
         </p:nvSpPr>
         <p:spPr>
           <a:xfrm>
-            <a:off x="4952714" y="5115580"/>
+            <a:off x="4952715" y="5115581"/>
             <a:ext cx="1475016" cy="307777"/>
           </a:xfrm>
           <a:prstGeom prst="rect">
@@ -9974,7 +9994,7 @@
         </p:nvSpPr>
         <p:spPr>
           <a:xfrm>
-            <a:off x="6035654" y="5310878"/>
+            <a:off x="6035655" y="5310879"/>
             <a:ext cx="146957" cy="146304"/>
           </a:xfrm>
           <a:prstGeom prst="ellipse">
@@ -10025,7 +10045,7 @@
         </p:nvSpPr>
         <p:spPr>
           <a:xfrm>
-            <a:off x="6222198" y="5261974"/>
+            <a:off x="6222199" y="5261976"/>
             <a:ext cx="1475016" cy="307777"/>
           </a:xfrm>
           <a:prstGeom prst="rect">
@@ -10064,7 +10084,7 @@
         </p:nvSpPr>
         <p:spPr>
           <a:xfrm>
-            <a:off x="6092474" y="4197991"/>
+            <a:off x="6092475" y="4197991"/>
             <a:ext cx="986451" cy="307777"/>
           </a:xfrm>
           <a:prstGeom prst="rect">
@@ -10108,7 +10128,7 @@
         </p:nvSpPr>
         <p:spPr>
           <a:xfrm>
-            <a:off x="6037994" y="4474416"/>
+            <a:off x="6037995" y="4474416"/>
             <a:ext cx="146957" cy="146304"/>
           </a:xfrm>
           <a:prstGeom prst="ellipse">
@@ -10164,7 +10184,7 @@
         <p:spPr>
           <a:xfrm>
             <a:off x="4178207" y="915436"/>
-            <a:ext cx="3401578" cy="523220"/>
+            <a:ext cx="3401579" cy="523220"/>
           </a:xfrm>
           <a:prstGeom prst="rect">
             <a:avLst/>
@@ -10200,7 +10220,7 @@
         <p:spPr>
           <a:xfrm>
             <a:off x="4171272" y="5814979"/>
-            <a:ext cx="3401578" cy="523220"/>
+            <a:ext cx="3401579" cy="523220"/>
           </a:xfrm>
           <a:prstGeom prst="rect">
             <a:avLst/>
@@ -10235,8 +10255,8 @@
         </p:nvSpPr>
         <p:spPr>
           <a:xfrm>
-            <a:off x="232970" y="3459327"/>
-            <a:ext cx="3401578" cy="738664"/>
+            <a:off x="232969" y="3459329"/>
+            <a:ext cx="3401579" cy="738664"/>
           </a:xfrm>
           <a:prstGeom prst="rect">
             <a:avLst/>
@@ -10275,8 +10295,8 @@
         </p:nvSpPr>
         <p:spPr>
           <a:xfrm>
-            <a:off x="7897434" y="3482922"/>
-            <a:ext cx="3401578" cy="523220"/>
+            <a:off x="7897433" y="3482922"/>
+            <a:ext cx="3401579" cy="523220"/>
           </a:xfrm>
           <a:prstGeom prst="rect">
             <a:avLst/>
@@ -10341,10 +10361,10 @@
         </p:nvGrpSpPr>
         <p:grpSpPr>
           <a:xfrm>
-            <a:off x="4054286" y="1787269"/>
-            <a:ext cx="4567330" cy="3750684"/>
+            <a:off x="4054285" y="1787269"/>
+            <a:ext cx="4567331" cy="3750685"/>
             <a:chOff x="7288873" y="1229328"/>
-            <a:chExt cx="4567330" cy="3750684"/>
+            <a:chExt cx="4567330" cy="3750683"/>
           </a:xfrm>
         </p:grpSpPr>
         <p:sp>
@@ -10396,7 +10416,7 @@
           </p:nvSpPr>
           <p:spPr>
             <a:xfrm>
-              <a:off x="7447230" y="2337427"/>
+              <a:off x="7447230" y="2337426"/>
               <a:ext cx="4293030" cy="738664"/>
             </a:xfrm>
             <a:prstGeom prst="rect">
@@ -10431,7 +10451,7 @@
           </p:nvSpPr>
           <p:spPr>
             <a:xfrm>
-              <a:off x="7447230" y="3402027"/>
+              <a:off x="7447230" y="3402029"/>
               <a:ext cx="4293030" cy="523220"/>
             </a:xfrm>
             <a:prstGeom prst="rect">
@@ -10466,7 +10486,7 @@
           </p:nvSpPr>
           <p:spPr>
             <a:xfrm>
-              <a:off x="7447230" y="4241348"/>
+              <a:off x="7447230" y="4241347"/>
               <a:ext cx="4293030" cy="738664"/>
             </a:xfrm>
             <a:prstGeom prst="rect">
@@ -10837,7 +10857,7 @@
         </p:nvCxnSpPr>
         <p:spPr>
           <a:xfrm>
-            <a:off x="1615675" y="3731085"/>
+            <a:off x="1615677" y="3731085"/>
             <a:ext cx="4435929" cy="0"/>
           </a:xfrm>
           <a:prstGeom prst="straightConnector1">
@@ -10881,8 +10901,8 @@
         </p:nvSpPr>
         <p:spPr>
           <a:xfrm>
-            <a:off x="5476381" y="4466898"/>
-            <a:ext cx="696702" cy="307777"/>
+            <a:off x="5476382" y="4466899"/>
+            <a:ext cx="696703" cy="307777"/>
           </a:xfrm>
           <a:prstGeom prst="rect">
             <a:avLst/>
@@ -10920,14 +10940,14 @@
             </a:extLst>
           </p:cNvPr>
           <p:cNvSpPr>
-            <a:spLocks noChangeAspect="1"/>
+            <a:spLocks/>
           </p:cNvSpPr>
           <p:nvPr/>
         </p:nvSpPr>
         <p:spPr>
           <a:xfrm>
-            <a:off x="5803872" y="4759145"/>
-            <a:ext cx="146957" cy="146304"/>
+            <a:off x="5803872" y="4759146"/>
+            <a:ext cx="137160" cy="136551"/>
           </a:xfrm>
           <a:prstGeom prst="ellipse">
             <a:avLst/>
@@ -10978,14 +10998,14 @@
             </a:extLst>
           </p:cNvPr>
           <p:cNvSpPr>
-            <a:spLocks noChangeAspect="1"/>
+            <a:spLocks/>
           </p:cNvSpPr>
           <p:nvPr/>
         </p:nvSpPr>
         <p:spPr>
           <a:xfrm>
-            <a:off x="5517172" y="4871112"/>
-            <a:ext cx="146957" cy="146304"/>
+            <a:off x="5517172" y="4871113"/>
+            <a:ext cx="137160" cy="136551"/>
           </a:xfrm>
           <a:prstGeom prst="ellipse">
             <a:avLst/>
@@ -11037,8 +11057,8 @@
         </p:nvSpPr>
         <p:spPr>
           <a:xfrm>
-            <a:off x="5121434" y="4877245"/>
-            <a:ext cx="509202" cy="307777"/>
+            <a:off x="5121433" y="4877245"/>
+            <a:ext cx="509203" cy="307777"/>
           </a:xfrm>
           <a:prstGeom prst="rect">
             <a:avLst/>
@@ -11076,14 +11096,14 @@
             </a:extLst>
           </p:cNvPr>
           <p:cNvSpPr>
-            <a:spLocks noChangeAspect="1"/>
+            <a:spLocks/>
           </p:cNvSpPr>
           <p:nvPr/>
         </p:nvSpPr>
         <p:spPr>
           <a:xfrm>
-            <a:off x="1922892" y="2047195"/>
-            <a:ext cx="136670" cy="136063"/>
+            <a:off x="1922893" y="2047196"/>
+            <a:ext cx="137160" cy="136550"/>
           </a:xfrm>
           <a:prstGeom prst="ellipse">
             <a:avLst/>
@@ -11135,7 +11155,7 @@
         </p:nvSpPr>
         <p:spPr>
           <a:xfrm>
-            <a:off x="2019047" y="1853386"/>
+            <a:off x="2019049" y="1853387"/>
             <a:ext cx="556983" cy="307777"/>
           </a:xfrm>
           <a:prstGeom prst="rect">
@@ -11175,7 +11195,7 @@
         </p:nvSpPr>
         <p:spPr>
           <a:xfrm>
-            <a:off x="1791945" y="4389951"/>
+            <a:off x="1791946" y="4389953"/>
             <a:ext cx="1141895" cy="738664"/>
           </a:xfrm>
           <a:prstGeom prst="rect">
@@ -11225,14 +11245,14 @@
             </a:extLst>
           </p:cNvPr>
           <p:cNvSpPr>
-            <a:spLocks noChangeAspect="1"/>
+            <a:spLocks/>
           </p:cNvSpPr>
           <p:nvPr/>
         </p:nvSpPr>
         <p:spPr>
           <a:xfrm>
-            <a:off x="2207527" y="2877526"/>
-            <a:ext cx="146957" cy="146304"/>
+            <a:off x="2207528" y="2877528"/>
+            <a:ext cx="137160" cy="136551"/>
           </a:xfrm>
           <a:prstGeom prst="ellipse">
             <a:avLst/>
@@ -11284,7 +11304,7 @@
         </p:nvSpPr>
         <p:spPr>
           <a:xfrm>
-            <a:off x="2306872" y="2817516"/>
+            <a:off x="2306872" y="2817517"/>
             <a:ext cx="1475016" cy="307777"/>
           </a:xfrm>
           <a:prstGeom prst="rect">
@@ -11323,14 +11343,14 @@
             </a:extLst>
           </p:cNvPr>
           <p:cNvSpPr>
-            <a:spLocks noChangeAspect="1"/>
+            <a:spLocks/>
           </p:cNvSpPr>
           <p:nvPr/>
         </p:nvSpPr>
         <p:spPr>
           <a:xfrm>
-            <a:off x="1694293" y="4445859"/>
-            <a:ext cx="146957" cy="146304"/>
+            <a:off x="1694294" y="4445860"/>
+            <a:ext cx="137160" cy="136551"/>
           </a:xfrm>
           <a:prstGeom prst="ellipse">
             <a:avLst/>
@@ -11382,8 +11402,8 @@
         </p:nvSpPr>
         <p:spPr>
           <a:xfrm>
-            <a:off x="3969732" y="2048820"/>
-            <a:ext cx="696702" cy="307777"/>
+            <a:off x="3969733" y="2048820"/>
+            <a:ext cx="696703" cy="307777"/>
           </a:xfrm>
           <a:prstGeom prst="rect">
             <a:avLst/>
@@ -11421,14 +11441,14 @@
             </a:extLst>
           </p:cNvPr>
           <p:cNvSpPr>
-            <a:spLocks noChangeAspect="1"/>
+            <a:spLocks/>
           </p:cNvSpPr>
           <p:nvPr/>
         </p:nvSpPr>
         <p:spPr>
           <a:xfrm>
-            <a:off x="4019696" y="2340849"/>
-            <a:ext cx="146957" cy="146304"/>
+            <a:off x="4019696" y="2340850"/>
+            <a:ext cx="137160" cy="136551"/>
           </a:xfrm>
           <a:prstGeom prst="ellipse">
             <a:avLst/>
@@ -11479,14 +11499,14 @@
             </a:extLst>
           </p:cNvPr>
           <p:cNvSpPr>
-            <a:spLocks noChangeAspect="1"/>
+            <a:spLocks/>
           </p:cNvSpPr>
           <p:nvPr/>
         </p:nvSpPr>
         <p:spPr>
           <a:xfrm>
-            <a:off x="4748732" y="2772377"/>
-            <a:ext cx="146957" cy="146304"/>
+            <a:off x="4748732" y="2772378"/>
+            <a:ext cx="137160" cy="136551"/>
           </a:xfrm>
           <a:prstGeom prst="ellipse">
             <a:avLst/>
@@ -11577,14 +11597,14 @@
             </a:extLst>
           </p:cNvPr>
           <p:cNvSpPr>
-            <a:spLocks noChangeAspect="1"/>
+            <a:spLocks/>
           </p:cNvSpPr>
           <p:nvPr/>
         </p:nvSpPr>
         <p:spPr>
           <a:xfrm>
-            <a:off x="2933841" y="5362556"/>
-            <a:ext cx="146957" cy="146304"/>
+            <a:off x="2933842" y="5362557"/>
+            <a:ext cx="137160" cy="136551"/>
           </a:xfrm>
           <a:prstGeom prst="ellipse">
             <a:avLst/>
@@ -11636,7 +11656,7 @@
         </p:nvSpPr>
         <p:spPr>
           <a:xfrm>
-            <a:off x="2933841" y="5115580"/>
+            <a:off x="2933841" y="5115581"/>
             <a:ext cx="1475016" cy="307777"/>
           </a:xfrm>
           <a:prstGeom prst="rect">
@@ -11675,14 +11695,14 @@
             </a:extLst>
           </p:cNvPr>
           <p:cNvSpPr>
-            <a:spLocks noChangeAspect="1"/>
+            <a:spLocks/>
           </p:cNvSpPr>
           <p:nvPr/>
         </p:nvSpPr>
         <p:spPr>
           <a:xfrm>
-            <a:off x="4016781" y="5310878"/>
-            <a:ext cx="146957" cy="146304"/>
+            <a:off x="4016782" y="5310880"/>
+            <a:ext cx="137160" cy="136551"/>
           </a:xfrm>
           <a:prstGeom prst="ellipse">
             <a:avLst/>
@@ -11734,7 +11754,7 @@
         </p:nvSpPr>
         <p:spPr>
           <a:xfrm>
-            <a:off x="4203325" y="5261974"/>
+            <a:off x="4203325" y="5261976"/>
             <a:ext cx="1475016" cy="307777"/>
           </a:xfrm>
           <a:prstGeom prst="rect">
@@ -11813,14 +11833,14 @@
             </a:extLst>
           </p:cNvPr>
           <p:cNvSpPr>
-            <a:spLocks noChangeAspect="1"/>
+            <a:spLocks/>
           </p:cNvSpPr>
           <p:nvPr/>
         </p:nvSpPr>
         <p:spPr>
           <a:xfrm>
-            <a:off x="4019121" y="4474416"/>
-            <a:ext cx="146957" cy="146304"/>
+            <a:off x="4019122" y="4474417"/>
+            <a:ext cx="137160" cy="136551"/>
           </a:xfrm>
           <a:prstGeom prst="ellipse">
             <a:avLst/>
@@ -11875,8 +11895,8 @@
         </p:nvSpPr>
         <p:spPr>
           <a:xfrm>
-            <a:off x="2159334" y="915436"/>
-            <a:ext cx="3401578" cy="523220"/>
+            <a:off x="2159333" y="915436"/>
+            <a:ext cx="3401579" cy="523220"/>
           </a:xfrm>
           <a:prstGeom prst="rect">
             <a:avLst/>
@@ -11914,7 +11934,7 @@
         <p:spPr>
           <a:xfrm>
             <a:off x="2152399" y="5814979"/>
-            <a:ext cx="3401578" cy="523220"/>
+            <a:ext cx="3401579" cy="523220"/>
           </a:xfrm>
           <a:prstGeom prst="rect">
             <a:avLst/>
@@ -11951,8 +11971,8 @@
         </p:nvSpPr>
         <p:spPr>
           <a:xfrm>
-            <a:off x="100549" y="2893455"/>
-            <a:ext cx="1515125" cy="1600438"/>
+            <a:off x="188274" y="2893455"/>
+            <a:ext cx="1427401" cy="1815882"/>
           </a:xfrm>
           <a:prstGeom prst="rect">
             <a:avLst/>
@@ -11989,8 +12009,8 @@
         </p:nvSpPr>
         <p:spPr>
           <a:xfrm>
-            <a:off x="5993287" y="3040053"/>
-            <a:ext cx="1402505" cy="1169551"/>
+            <a:off x="5993289" y="3040053"/>
+            <a:ext cx="1246237" cy="1384995"/>
           </a:xfrm>
           <a:prstGeom prst="rect">
             <a:avLst/>
@@ -12027,10 +12047,10 @@
         </p:nvGrpSpPr>
         <p:grpSpPr>
           <a:xfrm>
-            <a:off x="7508671" y="1064017"/>
-            <a:ext cx="2523994" cy="5012572"/>
-            <a:chOff x="7294267" y="1229328"/>
-            <a:chExt cx="2832315" cy="3966127"/>
+            <a:off x="7477532" y="919360"/>
+            <a:ext cx="2133125" cy="5468827"/>
+            <a:chOff x="7315943" y="1417633"/>
+            <a:chExt cx="2594098" cy="4003802"/>
           </a:xfrm>
         </p:grpSpPr>
         <p:sp>
@@ -12047,8 +12067,8 @@
           </p:nvSpPr>
           <p:spPr>
             <a:xfrm>
-              <a:off x="7454686" y="1229328"/>
-              <a:ext cx="2671890" cy="925391"/>
+              <a:off x="7471263" y="1417633"/>
+              <a:ext cx="2438778" cy="1171702"/>
             </a:xfrm>
             <a:prstGeom prst="rect">
               <a:avLst/>
@@ -12084,8 +12104,8 @@
           </p:nvSpPr>
           <p:spPr>
             <a:xfrm>
-              <a:off x="7447231" y="2337427"/>
-              <a:ext cx="2679345" cy="925391"/>
+              <a:off x="7456475" y="2589197"/>
+              <a:ext cx="2446240" cy="1013973"/>
             </a:xfrm>
             <a:prstGeom prst="rect">
               <a:avLst/>
@@ -12121,8 +12141,8 @@
           </p:nvSpPr>
           <p:spPr>
             <a:xfrm>
-              <a:off x="7447231" y="3402027"/>
-              <a:ext cx="2679351" cy="754924"/>
+              <a:off x="7453690" y="3572714"/>
+              <a:ext cx="2456351" cy="856244"/>
             </a:xfrm>
             <a:prstGeom prst="rect">
               <a:avLst/>
@@ -12158,8 +12178,8 @@
           </p:nvSpPr>
           <p:spPr>
             <a:xfrm>
-              <a:off x="7447231" y="4241348"/>
-              <a:ext cx="2679345" cy="954107"/>
+              <a:off x="7478588" y="4407462"/>
+              <a:ext cx="2431453" cy="1013973"/>
             </a:xfrm>
             <a:prstGeom prst="rect">
               <a:avLst/>
@@ -12194,14 +12214,14 @@
               </a:extLst>
             </p:cNvPr>
             <p:cNvSpPr>
-              <a:spLocks noChangeAspect="1"/>
+              <a:spLocks/>
             </p:cNvSpPr>
             <p:nvPr/>
           </p:nvSpPr>
           <p:spPr>
             <a:xfrm>
-              <a:off x="7297001" y="1289323"/>
-              <a:ext cx="189295" cy="144701"/>
+              <a:off x="7317008" y="1490814"/>
+              <a:ext cx="166801" cy="100417"/>
             </a:xfrm>
             <a:prstGeom prst="ellipse">
               <a:avLst/>
@@ -12258,8 +12278,8 @@
           </p:nvSpPr>
           <p:spPr>
             <a:xfrm>
-              <a:off x="7294267" y="2399333"/>
-              <a:ext cx="189295" cy="144701"/>
+              <a:off x="7317009" y="2663857"/>
+              <a:ext cx="166801" cy="92759"/>
             </a:xfrm>
             <a:prstGeom prst="ellipse">
               <a:avLst/>
@@ -12316,8 +12336,8 @@
           </p:nvSpPr>
           <p:spPr>
             <a:xfrm>
-              <a:off x="7297001" y="3464463"/>
-              <a:ext cx="189295" cy="144701"/>
+              <a:off x="7322233" y="3645895"/>
+              <a:ext cx="166801" cy="94099"/>
             </a:xfrm>
             <a:prstGeom prst="ellipse">
               <a:avLst/>
@@ -12374,8 +12394,8 @@
           </p:nvSpPr>
           <p:spPr>
             <a:xfrm>
-              <a:off x="7295579" y="4294143"/>
-              <a:ext cx="189295" cy="144701"/>
+              <a:off x="7315943" y="4478297"/>
+              <a:ext cx="167789" cy="100417"/>
             </a:xfrm>
             <a:prstGeom prst="ellipse">
               <a:avLst/>
@@ -12709,7 +12729,7 @@
         </p:nvCxnSpPr>
         <p:spPr>
           <a:xfrm>
-            <a:off x="1698171" y="3460001"/>
+            <a:off x="1698173" y="3460001"/>
             <a:ext cx="4435929" cy="0"/>
           </a:xfrm>
           <a:prstGeom prst="straightConnector1">
@@ -12753,8 +12773,8 @@
         </p:nvSpPr>
         <p:spPr>
           <a:xfrm>
-            <a:off x="2351314" y="6296740"/>
-            <a:ext cx="2922815" cy="369296"/>
+            <a:off x="2351315" y="6296741"/>
+            <a:ext cx="2922815" cy="369332"/>
           </a:xfrm>
           <a:prstGeom prst="rect">
             <a:avLst/>
@@ -12828,7 +12848,7 @@
         </p:nvSpPr>
         <p:spPr>
           <a:xfrm>
-            <a:off x="10300926" y="6538611"/>
+            <a:off x="10300927" y="6538611"/>
             <a:ext cx="146957" cy="146304"/>
           </a:xfrm>
           <a:prstGeom prst="ellipse">
@@ -12880,7 +12900,7 @@
         <p:spPr>
           <a:xfrm>
             <a:off x="10447883" y="6382905"/>
-            <a:ext cx="1594298" cy="307777"/>
+            <a:ext cx="1594299" cy="307777"/>
           </a:xfrm>
           <a:prstGeom prst="rect">
             <a:avLst/>
@@ -12915,7 +12935,7 @@
         <p:spPr>
           <a:xfrm>
             <a:off x="6008898" y="4912104"/>
-            <a:ext cx="696702" cy="307777"/>
+            <a:ext cx="696703" cy="307777"/>
           </a:xfrm>
           <a:prstGeom prst="rect">
             <a:avLst/>
@@ -12958,7 +12978,7 @@
         </p:nvSpPr>
         <p:spPr>
           <a:xfrm>
-            <a:off x="5920234" y="4951856"/>
+            <a:off x="5920235" y="4951856"/>
             <a:ext cx="146957" cy="146304"/>
           </a:xfrm>
           <a:prstGeom prst="ellipse">
@@ -13014,7 +13034,7 @@
         </p:nvSpPr>
         <p:spPr>
           <a:xfrm>
-            <a:off x="5803693" y="4871179"/>
+            <a:off x="5803694" y="4871179"/>
             <a:ext cx="146957" cy="146304"/>
           </a:xfrm>
           <a:prstGeom prst="ellipse">
@@ -13065,7 +13085,7 @@
         </p:nvSpPr>
         <p:spPr>
           <a:xfrm>
-            <a:off x="5803693" y="4624203"/>
+            <a:off x="5803693" y="4624204"/>
             <a:ext cx="1475016" cy="307777"/>
           </a:xfrm>
           <a:prstGeom prst="rect">
@@ -13109,7 +13129,7 @@
         </p:nvSpPr>
         <p:spPr>
           <a:xfrm>
-            <a:off x="1836055" y="1623711"/>
+            <a:off x="1836056" y="1623711"/>
             <a:ext cx="146957" cy="146304"/>
           </a:xfrm>
           <a:prstGeom prst="ellipse">
@@ -13160,7 +13180,7 @@
         </p:nvSpPr>
         <p:spPr>
           <a:xfrm>
-            <a:off x="1932211" y="1429905"/>
+            <a:off x="1932213" y="1429905"/>
             <a:ext cx="556983" cy="307777"/>
           </a:xfrm>
           <a:prstGeom prst="rect">
@@ -13199,8 +13219,8 @@
         </p:nvSpPr>
         <p:spPr>
           <a:xfrm>
-            <a:off x="1908309" y="5009503"/>
-            <a:ext cx="696702" cy="307777"/>
+            <a:off x="1908310" y="5009503"/>
+            <a:ext cx="696703" cy="307777"/>
           </a:xfrm>
           <a:prstGeom prst="rect">
             <a:avLst/>
@@ -13243,7 +13263,7 @@
         </p:nvSpPr>
         <p:spPr>
           <a:xfrm>
-            <a:off x="1866693" y="4943225"/>
+            <a:off x="1866694" y="4943225"/>
             <a:ext cx="146957" cy="146304"/>
           </a:xfrm>
           <a:prstGeom prst="ellipse">
@@ -13338,7 +13358,7 @@
         </p:nvSpPr>
         <p:spPr>
           <a:xfrm>
-            <a:off x="1810655" y="5065411"/>
+            <a:off x="1810656" y="5065411"/>
             <a:ext cx="146957" cy="146304"/>
           </a:xfrm>
           <a:prstGeom prst="ellipse">
@@ -13390,7 +13410,7 @@
         <p:spPr>
           <a:xfrm>
             <a:off x="2968498" y="2991495"/>
-            <a:ext cx="696702" cy="307777"/>
+            <a:ext cx="696703" cy="307777"/>
           </a:xfrm>
           <a:prstGeom prst="rect">
             <a:avLst/>
@@ -13433,7 +13453,7 @@
         </p:nvSpPr>
         <p:spPr>
           <a:xfrm>
-            <a:off x="3577259" y="3232725"/>
+            <a:off x="3577260" y="3232725"/>
             <a:ext cx="146957" cy="146304"/>
           </a:xfrm>
           <a:prstGeom prst="ellipse">
@@ -13489,7 +13509,7 @@
         </p:nvSpPr>
         <p:spPr>
           <a:xfrm>
-            <a:off x="4443486" y="3639156"/>
+            <a:off x="4443487" y="3639156"/>
             <a:ext cx="146957" cy="146304"/>
           </a:xfrm>
           <a:prstGeom prst="ellipse">
@@ -13540,7 +13560,7 @@
         </p:nvSpPr>
         <p:spPr>
           <a:xfrm>
-            <a:off x="4443486" y="3702146"/>
+            <a:off x="4443487" y="3702147"/>
             <a:ext cx="683677" cy="307777"/>
           </a:xfrm>
           <a:prstGeom prst="rect">
@@ -13584,7 +13604,7 @@
         </p:nvSpPr>
         <p:spPr>
           <a:xfrm>
-            <a:off x="3016337" y="5040671"/>
+            <a:off x="3016338" y="5040671"/>
             <a:ext cx="146957" cy="146304"/>
           </a:xfrm>
           <a:prstGeom prst="ellipse">
@@ -13635,7 +13655,7 @@
         </p:nvSpPr>
         <p:spPr>
           <a:xfrm>
-            <a:off x="3016337" y="4793695"/>
+            <a:off x="3016337" y="4793696"/>
             <a:ext cx="1475016" cy="307777"/>
           </a:xfrm>
           <a:prstGeom prst="rect">
@@ -13679,7 +13699,7 @@
         </p:nvSpPr>
         <p:spPr>
           <a:xfrm>
-            <a:off x="3049094" y="4321396"/>
+            <a:off x="3049095" y="4321396"/>
             <a:ext cx="146957" cy="146304"/>
           </a:xfrm>
           <a:prstGeom prst="ellipse">
@@ -13730,7 +13750,7 @@
         </p:nvSpPr>
         <p:spPr>
           <a:xfrm>
-            <a:off x="2119195" y="4136412"/>
+            <a:off x="2119195" y="4136413"/>
             <a:ext cx="1475016" cy="307777"/>
           </a:xfrm>
           <a:prstGeom prst="rect">
@@ -13769,7 +13789,7 @@
         </p:nvSpPr>
         <p:spPr>
           <a:xfrm>
-            <a:off x="3784138" y="4783677"/>
+            <a:off x="3784139" y="4783677"/>
             <a:ext cx="986451" cy="307777"/>
           </a:xfrm>
           <a:prstGeom prst="rect">
@@ -13813,7 +13833,7 @@
         </p:nvSpPr>
         <p:spPr>
           <a:xfrm>
-            <a:off x="3791651" y="5060102"/>
+            <a:off x="3791652" y="5060103"/>
             <a:ext cx="146957" cy="146304"/>
           </a:xfrm>
           <a:prstGeom prst="ellipse">
@@ -13871,12 +13891,12 @@
         </p:nvCxnSpPr>
         <p:spPr>
           <a:xfrm flipV="1">
-            <a:off x="1932211" y="4610680"/>
-            <a:ext cx="5515019" cy="647121"/>
+            <a:off x="1932213" y="4610681"/>
+            <a:ext cx="5515017" cy="647126"/>
           </a:xfrm>
           <a:prstGeom prst="bentConnector3">
             <a:avLst>
-              <a:gd name="adj1" fmla="val 92434"/>
+              <a:gd name="adj1" fmla="val 50000"/>
             </a:avLst>
           </a:prstGeom>
           <a:ln w="6350">
@@ -13920,12 +13940,12 @@
         </p:nvCxnSpPr>
         <p:spPr>
           <a:xfrm flipV="1">
-            <a:off x="6067191" y="3663637"/>
-            <a:ext cx="1380039" cy="1279592"/>
+            <a:off x="6067192" y="3663637"/>
+            <a:ext cx="1380038" cy="1279595"/>
           </a:xfrm>
           <a:prstGeom prst="bentConnector3">
             <a:avLst>
-              <a:gd name="adj1" fmla="val 15186"/>
+              <a:gd name="adj1" fmla="val 50000"/>
             </a:avLst>
           </a:prstGeom>
           <a:ln w="6350">
@@ -13968,7 +13988,7 @@
         </p:nvCxnSpPr>
         <p:spPr>
           <a:xfrm flipV="1">
-            <a:off x="3631081" y="2564350"/>
+            <a:off x="3631082" y="2564351"/>
             <a:ext cx="3823604" cy="631903"/>
           </a:xfrm>
           <a:prstGeom prst="bentConnector3">
@@ -14016,8 +14036,8 @@
         </p:nvCxnSpPr>
         <p:spPr>
           <a:xfrm>
-            <a:off x="2351314" y="1600199"/>
-            <a:ext cx="5103371" cy="7354"/>
+            <a:off x="2351315" y="1600199"/>
+            <a:ext cx="5103371" cy="7355"/>
           </a:xfrm>
           <a:prstGeom prst="line">
             <a:avLst/>
@@ -14059,8 +14079,8 @@
         </p:nvSpPr>
         <p:spPr>
           <a:xfrm>
-            <a:off x="7454685" y="1229328"/>
-            <a:ext cx="4401518" cy="954107"/>
+            <a:off x="7454686" y="1229329"/>
+            <a:ext cx="4401519" cy="954107"/>
           </a:xfrm>
           <a:prstGeom prst="rect">
             <a:avLst/>
@@ -14095,7 +14115,7 @@
         <p:spPr>
           <a:xfrm>
             <a:off x="7447230" y="2337427"/>
-            <a:ext cx="4293030" cy="738664"/>
+            <a:ext cx="4293031" cy="738664"/>
           </a:xfrm>
           <a:prstGeom prst="rect">
             <a:avLst/>
@@ -14130,7 +14150,7 @@
         <p:spPr>
           <a:xfrm>
             <a:off x="7447230" y="3402027"/>
-            <a:ext cx="4293030" cy="523220"/>
+            <a:ext cx="4293031" cy="523220"/>
           </a:xfrm>
           <a:prstGeom prst="rect">
             <a:avLst/>
@@ -14164,8 +14184,8 @@
         </p:nvSpPr>
         <p:spPr>
           <a:xfrm>
-            <a:off x="7447230" y="4241348"/>
-            <a:ext cx="4293030" cy="738664"/>
+            <a:off x="7447230" y="4241349"/>
+            <a:ext cx="4293031" cy="738664"/>
           </a:xfrm>
           <a:prstGeom prst="rect">
             <a:avLst/>
@@ -14199,8 +14219,8 @@
         </p:nvSpPr>
         <p:spPr>
           <a:xfrm>
-            <a:off x="2241830" y="778822"/>
-            <a:ext cx="3401578" cy="523220"/>
+            <a:off x="2241829" y="778822"/>
+            <a:ext cx="3401579" cy="523220"/>
           </a:xfrm>
           <a:prstGeom prst="rect">
             <a:avLst/>
@@ -14235,8 +14255,8 @@
         </p:nvSpPr>
         <p:spPr>
           <a:xfrm>
-            <a:off x="2234895" y="5395978"/>
-            <a:ext cx="3401578" cy="523220"/>
+            <a:off x="2234895" y="5395979"/>
+            <a:ext cx="3401579" cy="523220"/>
           </a:xfrm>
           <a:prstGeom prst="rect">
             <a:avLst/>
@@ -14308,7 +14328,7 @@
         <p:spPr>
           <a:xfrm rot="16200000">
             <a:off x="4861052" y="3195467"/>
-            <a:ext cx="3401578" cy="523220"/>
+            <a:ext cx="3401579" cy="523220"/>
           </a:xfrm>
           <a:prstGeom prst="rect">
             <a:avLst/>

</xml_diff>